<commit_message>
Updated pretty presentation after Karlsson meeting.
</commit_message>
<xml_diff>
--- a/Documents/MICS/MICSPrettyPrez.pptx
+++ b/Documents/MICS/MICSPrettyPrez.pptx
@@ -5379,7 +5379,7 @@
         </p:nvSpPr>
         <p:spPr>
           <a:xfrm>
-            <a:off x="1034415" y="6324600"/>
+            <a:off x="2029326" y="6553200"/>
             <a:ext cx="49149000" cy="9362435"/>
           </a:xfrm>
           <a:prstGeom prst="rect">
@@ -5681,7 +5681,7 @@
         </p:nvSpPr>
         <p:spPr>
           <a:xfrm>
-            <a:off x="1066800" y="5467962"/>
+            <a:off x="1905000" y="6139248"/>
             <a:ext cx="24917400" cy="21288777"/>
           </a:xfrm>
           <a:prstGeom prst="rect">
@@ -5800,6 +5800,64 @@
           </a:p>
         </p:txBody>
       </p:sp>
+      <p:pic>
+        <p:nvPicPr>
+          <p:cNvPr id="3" name="Picture 2"/>
+          <p:cNvPicPr>
+            <a:picLocks noChangeAspect="1"/>
+          </p:cNvPicPr>
+          <p:nvPr/>
+        </p:nvPicPr>
+        <p:blipFill rotWithShape="1">
+          <a:blip r:embed="rId4">
+            <a:extLst>
+              <a:ext uri="{28A0092B-C50C-407E-A947-70E740481C1C}">
+                <a14:useLocalDpi xmlns:a14="http://schemas.microsoft.com/office/drawing/2010/main" val="0"/>
+              </a:ext>
+            </a:extLst>
+          </a:blip>
+          <a:srcRect l="10246" b="10929"/>
+          <a:stretch/>
+        </p:blipFill>
+        <p:spPr>
+          <a:xfrm>
+            <a:off x="30556200" y="8991600"/>
+            <a:ext cx="16687800" cy="12420600"/>
+          </a:xfrm>
+          <a:prstGeom prst="rect">
+            <a:avLst/>
+          </a:prstGeom>
+          <a:solidFill>
+            <a:srgbClr val="FFFFFF">
+              <a:shade val="85000"/>
+            </a:srgbClr>
+          </a:solidFill>
+          <a:ln w="190500" cap="rnd">
+            <a:solidFill>
+              <a:srgbClr val="FFFFFF"/>
+            </a:solidFill>
+          </a:ln>
+          <a:effectLst>
+            <a:outerShdw blurRad="50000" algn="tl" rotWithShape="0">
+              <a:srgbClr val="000000">
+                <a:alpha val="41000"/>
+              </a:srgbClr>
+            </a:outerShdw>
+          </a:effectLst>
+          <a:scene3d>
+            <a:camera prst="orthographicFront"/>
+            <a:lightRig rig="twoPt" dir="t">
+              <a:rot lat="0" lon="0" rev="7800000"/>
+            </a:lightRig>
+          </a:scene3d>
+          <a:sp3d contourW="6350">
+            <a:bevelT w="50800" h="16510"/>
+            <a:contourClr>
+              <a:srgbClr val="C0C0C0"/>
+            </a:contourClr>
+          </a:sp3d>
+        </p:spPr>
+      </p:pic>
     </p:spTree>
     <p:extLst>
       <p:ext uri="{BB962C8B-B14F-4D97-AF65-F5344CB8AC3E}">
@@ -6400,7 +6458,7 @@
         </p:nvSpPr>
         <p:spPr>
           <a:xfrm>
-            <a:off x="1491615" y="6019800"/>
+            <a:off x="2286000" y="6400800"/>
             <a:ext cx="48234600" cy="19134341"/>
           </a:xfrm>
           <a:prstGeom prst="rect">
@@ -6577,7 +6635,7 @@
         </p:blipFill>
         <p:spPr>
           <a:xfrm>
-            <a:off x="35966400" y="7130900"/>
+            <a:off x="34366200" y="7511900"/>
             <a:ext cx="11529906" cy="16912140"/>
           </a:xfrm>
           <a:prstGeom prst="rect">
@@ -6834,7 +6892,7 @@
         </p:nvSpPr>
         <p:spPr>
           <a:xfrm>
-            <a:off x="1034415" y="6400800"/>
+            <a:off x="2021305" y="7086600"/>
             <a:ext cx="49149000" cy="13455863"/>
           </a:xfrm>
           <a:prstGeom prst="rect">
@@ -6944,7 +7002,7 @@
         </p:blipFill>
         <p:spPr>
           <a:xfrm>
-            <a:off x="28121811" y="8077200"/>
+            <a:off x="25608915" y="8153400"/>
             <a:ext cx="22367770" cy="13823282"/>
           </a:xfrm>
           <a:prstGeom prst="rect">
@@ -7172,7 +7230,7 @@
         </p:nvSpPr>
         <p:spPr>
           <a:xfrm>
-            <a:off x="990600" y="5791200"/>
+            <a:off x="1600200" y="6629400"/>
             <a:ext cx="49149000" cy="9362435"/>
           </a:xfrm>
           <a:prstGeom prst="rect">
@@ -7785,7 +7843,6 @@
               <a:rPr lang="en-US" sz="14500" dirty="0" smtClean="0"/>
               <a:t>Supercomputers</a:t>
             </a:r>
-            <a:endParaRPr lang="en-US" sz="14500" dirty="0" smtClean="0"/>
           </a:p>
         </p:txBody>
       </p:sp>
@@ -8253,7 +8310,7 @@
         </p:nvSpPr>
         <p:spPr>
           <a:xfrm>
-            <a:off x="1295400" y="6248400"/>
+            <a:off x="1676400" y="6310246"/>
             <a:ext cx="25069800" cy="19964400"/>
           </a:xfrm>
           <a:prstGeom prst="rect">
@@ -8507,7 +8564,7 @@
         </p:nvSpPr>
         <p:spPr>
           <a:xfrm>
-            <a:off x="26365200" y="6683186"/>
+            <a:off x="26708100" y="6683187"/>
             <a:ext cx="23088600" cy="19529613"/>
           </a:xfrm>
           <a:prstGeom prst="rect">
@@ -8697,11 +8754,7 @@
             </a:pPr>
             <a:r>
               <a:rPr lang="en-US" sz="9600" dirty="0" smtClean="0"/>
-              <a:t>	$</a:t>
-            </a:r>
-            <a:r>
-              <a:rPr lang="en-US" sz="9600" dirty="0" smtClean="0"/>
-              <a:t>75</a:t>
+              <a:t>	$75</a:t>
             </a:r>
           </a:p>
           <a:p>
@@ -8710,11 +8763,7 @@
             </a:pPr>
             <a:r>
               <a:rPr lang="en-US" sz="9600" dirty="0" smtClean="0"/>
-              <a:t>	4 </a:t>
-            </a:r>
-            <a:r>
-              <a:rPr lang="en-US" sz="9600" dirty="0" smtClean="0"/>
-              <a:t>a7 cores, 4 a15 cores</a:t>
+              <a:t>	4 a7 cores, 4 a15 cores</a:t>
             </a:r>
           </a:p>
           <a:p>
@@ -8723,11 +8772,7 @@
             </a:pPr>
             <a:r>
               <a:rPr lang="en-US" sz="9600" dirty="0" smtClean="0"/>
-              <a:t>	2 </a:t>
-            </a:r>
-            <a:r>
-              <a:rPr lang="en-US" sz="9600" dirty="0" smtClean="0"/>
-              <a:t>USB 3.0 ports, 1 USB 2.0 port</a:t>
+              <a:t>	2 USB 3.0 ports, 1 USB 2.0 port</a:t>
             </a:r>
           </a:p>
           <a:p>
@@ -8736,11 +8781,7 @@
             </a:pPr>
             <a:r>
               <a:rPr lang="en-US" sz="9600" dirty="0" smtClean="0"/>
-              <a:t>	2 </a:t>
-            </a:r>
-            <a:r>
-              <a:rPr lang="en-US" sz="9600" dirty="0" smtClean="0"/>
-              <a:t>GM memory</a:t>
+              <a:t>	2 GM memory</a:t>
             </a:r>
           </a:p>
           <a:p>
@@ -8749,11 +8790,7 @@
             </a:pPr>
             <a:r>
               <a:rPr lang="en-US" sz="9600" dirty="0" smtClean="0"/>
-              <a:t>	1 </a:t>
-            </a:r>
-            <a:r>
-              <a:rPr lang="en-US" sz="9600" dirty="0" smtClean="0"/>
-              <a:t>Gigabit Ethernet</a:t>
+              <a:t>	1 Gigabit Ethernet</a:t>
             </a:r>
             <a:endParaRPr lang="en-US" sz="9600" dirty="0"/>
           </a:p>
@@ -9328,7 +9365,7 @@
         </p:nvSpPr>
         <p:spPr>
           <a:xfrm>
-            <a:off x="990600" y="6264146"/>
+            <a:off x="1524000" y="6629400"/>
             <a:ext cx="49149000" cy="17281654"/>
           </a:xfrm>
           <a:prstGeom prst="rect">
@@ -9690,7 +9727,7 @@
         </p:nvSpPr>
         <p:spPr>
           <a:xfrm>
-            <a:off x="1034415" y="7439563"/>
+            <a:off x="2053389" y="7162800"/>
             <a:ext cx="49149000" cy="15364078"/>
           </a:xfrm>
           <a:prstGeom prst="rect">
@@ -10336,7 +10373,7 @@
         </p:nvSpPr>
         <p:spPr>
           <a:xfrm>
-            <a:off x="990600" y="6153344"/>
+            <a:off x="2057400" y="6629400"/>
             <a:ext cx="49149000" cy="12363256"/>
           </a:xfrm>
           <a:prstGeom prst="rect">

</xml_diff>

<commit_message>
I renamed a lot of our instruction files to include the date in them in order to write the experiment log of the document. I'm also pushing because I made a lot of changes to the log and I don't want to lose them all.
</commit_message>
<xml_diff>
--- a/Documents/MICS/MICSPrettyPrez.pptx
+++ b/Documents/MICS/MICSPrettyPrez.pptx
@@ -5,7 +5,7 @@
     <p:sldMasterId id="2147483672" r:id="rId1"/>
   </p:sldMasterIdLst>
   <p:notesMasterIdLst>
-    <p:notesMasterId r:id="rId18"/>
+    <p:notesMasterId r:id="rId21"/>
   </p:notesMasterIdLst>
   <p:sldIdLst>
     <p:sldId id="257" r:id="rId2"/>
@@ -19,11 +19,14 @@
     <p:sldId id="264" r:id="rId10"/>
     <p:sldId id="265" r:id="rId11"/>
     <p:sldId id="266" r:id="rId12"/>
-    <p:sldId id="267" r:id="rId13"/>
-    <p:sldId id="268" r:id="rId14"/>
-    <p:sldId id="269" r:id="rId15"/>
-    <p:sldId id="270" r:id="rId16"/>
-    <p:sldId id="271" r:id="rId17"/>
+    <p:sldId id="274" r:id="rId13"/>
+    <p:sldId id="267" r:id="rId14"/>
+    <p:sldId id="276" r:id="rId15"/>
+    <p:sldId id="275" r:id="rId16"/>
+    <p:sldId id="268" r:id="rId17"/>
+    <p:sldId id="269" r:id="rId18"/>
+    <p:sldId id="270" r:id="rId19"/>
+    <p:sldId id="271" r:id="rId20"/>
   </p:sldIdLst>
   <p:sldSz cx="51206400" cy="28803600"/>
   <p:notesSz cx="6858000" cy="9144000"/>
@@ -223,7 +226,7 @@
           <a:p>
             <a:fld id="{1FFF1A5C-C5F7-4CAE-9CBE-ED570DBFFEAF}" type="datetimeFigureOut">
               <a:rPr lang="en-US" smtClean="0"/>
-              <a:t>4/18/2016</a:t>
+              <a:t>4/22/2016</a:t>
             </a:fld>
             <a:endParaRPr lang="en-US"/>
           </a:p>
@@ -713,7 +716,17 @@
           <a:p>
             <a:r>
               <a:rPr lang="en-US" dirty="0" smtClean="0"/>
-              <a:t>ah</a:t>
+              <a:t>Ah</a:t>
+            </a:r>
+          </a:p>
+          <a:p>
+            <a:r>
+              <a:rPr lang="en-US" dirty="0" smtClean="0"/>
+              <a:t>Switch WILL be the bottle neck</a:t>
+            </a:r>
+            <a:r>
+              <a:rPr lang="en-US" baseline="0" dirty="0" smtClean="0"/>
+              <a:t> - transition</a:t>
             </a:r>
             <a:endParaRPr lang="en-US" dirty="0"/>
           </a:p>
@@ -800,8 +813,22 @@
           <a:lstStyle/>
           <a:p>
             <a:r>
-              <a:rPr lang="en-US" dirty="0" err="1" smtClean="0"/>
-              <a:t>cs</a:t>
+              <a:rPr lang="en-US" dirty="0" smtClean="0"/>
+              <a:t>Cs</a:t>
+            </a:r>
+          </a:p>
+          <a:p>
+            <a:r>
+              <a:rPr lang="en-US" dirty="0" smtClean="0"/>
+              <a:t>We did get the ring/hypercube</a:t>
+            </a:r>
+            <a:r>
+              <a:rPr lang="en-US" baseline="0" dirty="0" smtClean="0"/>
+              <a:t> to work, but not with </a:t>
+            </a:r>
+            <a:r>
+              <a:rPr lang="en-US" baseline="0" dirty="0" err="1" smtClean="0"/>
+              <a:t>linpack</a:t>
             </a:r>
             <a:endParaRPr lang="en-US" dirty="0"/>
           </a:p>
@@ -833,7 +860,7 @@
     </p:spTree>
     <p:extLst>
       <p:ext uri="{BB962C8B-B14F-4D97-AF65-F5344CB8AC3E}">
-        <p14:creationId xmlns:p14="http://schemas.microsoft.com/office/powerpoint/2010/main" val="2215308247"/>
+        <p14:creationId xmlns:p14="http://schemas.microsoft.com/office/powerpoint/2010/main" val="2676542425"/>
       </p:ext>
     </p:extLst>
   </p:cSld>
@@ -888,8 +915,22 @@
           <a:lstStyle/>
           <a:p>
             <a:r>
-              <a:rPr lang="en-US" dirty="0" err="1" smtClean="0"/>
-              <a:t>cs</a:t>
+              <a:rPr lang="en-US" dirty="0" smtClean="0"/>
+              <a:t>Cs</a:t>
+            </a:r>
+          </a:p>
+          <a:p>
+            <a:r>
+              <a:rPr lang="en-US" dirty="0" smtClean="0"/>
+              <a:t>We did get the ring/hypercube</a:t>
+            </a:r>
+            <a:r>
+              <a:rPr lang="en-US" baseline="0" dirty="0" smtClean="0"/>
+              <a:t> to work, but not with </a:t>
+            </a:r>
+            <a:r>
+              <a:rPr lang="en-US" baseline="0" dirty="0" err="1" smtClean="0"/>
+              <a:t>linpack</a:t>
             </a:r>
             <a:endParaRPr lang="en-US" dirty="0"/>
           </a:p>
@@ -921,7 +962,7 @@
     </p:spTree>
     <p:extLst>
       <p:ext uri="{BB962C8B-B14F-4D97-AF65-F5344CB8AC3E}">
-        <p14:creationId xmlns:p14="http://schemas.microsoft.com/office/powerpoint/2010/main" val="2443384298"/>
+        <p14:creationId xmlns:p14="http://schemas.microsoft.com/office/powerpoint/2010/main" val="2215308247"/>
       </p:ext>
     </p:extLst>
   </p:cSld>
@@ -977,7 +1018,21 @@
           <a:p>
             <a:r>
               <a:rPr lang="en-US" dirty="0" smtClean="0"/>
-              <a:t>ah</a:t>
+              <a:t>Cs</a:t>
+            </a:r>
+          </a:p>
+          <a:p>
+            <a:r>
+              <a:rPr lang="en-US" dirty="0" smtClean="0"/>
+              <a:t>We did get the ring/hypercube</a:t>
+            </a:r>
+            <a:r>
+              <a:rPr lang="en-US" baseline="0" dirty="0" smtClean="0"/>
+              <a:t> to work, but not with </a:t>
+            </a:r>
+            <a:r>
+              <a:rPr lang="en-US" baseline="0" dirty="0" err="1" smtClean="0"/>
+              <a:t>linpack</a:t>
             </a:r>
             <a:endParaRPr lang="en-US" dirty="0"/>
           </a:p>
@@ -1009,7 +1064,7 @@
     </p:spTree>
     <p:extLst>
       <p:ext uri="{BB962C8B-B14F-4D97-AF65-F5344CB8AC3E}">
-        <p14:creationId xmlns:p14="http://schemas.microsoft.com/office/powerpoint/2010/main" val="854687939"/>
+        <p14:creationId xmlns:p14="http://schemas.microsoft.com/office/powerpoint/2010/main" val="2583329311"/>
       </p:ext>
     </p:extLst>
   </p:cSld>
@@ -1064,10 +1119,14 @@
           <a:lstStyle/>
           <a:p>
             <a:r>
-              <a:rPr lang="en-US" dirty="0" err="1" smtClean="0"/>
-              <a:t>cs</a:t>
-            </a:r>
-            <a:endParaRPr lang="en-US" dirty="0"/>
+              <a:rPr lang="en-US" dirty="0" smtClean="0"/>
+              <a:t>Cs</a:t>
+            </a:r>
+            <a:r>
+              <a:rPr lang="en-US" baseline="0" dirty="0" smtClean="0"/>
+              <a:t> ah</a:t>
+            </a:r>
+            <a:endParaRPr lang="en-US" dirty="0" smtClean="0"/>
           </a:p>
         </p:txBody>
       </p:sp>
@@ -1097,7 +1156,7 @@
     </p:spTree>
     <p:extLst>
       <p:ext uri="{BB962C8B-B14F-4D97-AF65-F5344CB8AC3E}">
-        <p14:creationId xmlns:p14="http://schemas.microsoft.com/office/powerpoint/2010/main" val="521294893"/>
+        <p14:creationId xmlns:p14="http://schemas.microsoft.com/office/powerpoint/2010/main" val="3246649799"/>
       </p:ext>
     </p:extLst>
   </p:cSld>
@@ -1177,6 +1236,270 @@
             <a:fld id="{7B91EEE6-72E6-42D7-884B-8721B2C32774}" type="slidenum">
               <a:rPr lang="en-US" smtClean="0"/>
               <a:t>16</a:t>
+            </a:fld>
+            <a:endParaRPr lang="en-US"/>
+          </a:p>
+        </p:txBody>
+      </p:sp>
+    </p:spTree>
+    <p:extLst>
+      <p:ext uri="{BB962C8B-B14F-4D97-AF65-F5344CB8AC3E}">
+        <p14:creationId xmlns:p14="http://schemas.microsoft.com/office/powerpoint/2010/main" val="2443384298"/>
+      </p:ext>
+    </p:extLst>
+  </p:cSld>
+  <p:clrMapOvr>
+    <a:masterClrMapping/>
+  </p:clrMapOvr>
+</p:notes>
+</file>
+
+<file path=ppt/notesSlides/notesSlide17.xml><?xml version="1.0" encoding="utf-8"?>
+<p:notes xmlns:a="http://schemas.openxmlformats.org/drawingml/2006/main" xmlns:r="http://schemas.openxmlformats.org/officeDocument/2006/relationships" xmlns:p="http://schemas.openxmlformats.org/presentationml/2006/main">
+  <p:cSld>
+    <p:spTree>
+      <p:nvGrpSpPr>
+        <p:cNvPr id="1" name=""/>
+        <p:cNvGrpSpPr/>
+        <p:nvPr/>
+      </p:nvGrpSpPr>
+      <p:grpSpPr>
+        <a:xfrm>
+          <a:off x="0" y="0"/>
+          <a:ext cx="0" cy="0"/>
+          <a:chOff x="0" y="0"/>
+          <a:chExt cx="0" cy="0"/>
+        </a:xfrm>
+      </p:grpSpPr>
+      <p:sp>
+        <p:nvSpPr>
+          <p:cNvPr id="2" name="Slide Image Placeholder 1"/>
+          <p:cNvSpPr>
+            <a:spLocks noGrp="1" noRot="1" noChangeAspect="1"/>
+          </p:cNvSpPr>
+          <p:nvPr>
+            <p:ph type="sldImg"/>
+          </p:nvPr>
+        </p:nvSpPr>
+        <p:spPr/>
+      </p:sp>
+      <p:sp>
+        <p:nvSpPr>
+          <p:cNvPr id="3" name="Notes Placeholder 2"/>
+          <p:cNvSpPr>
+            <a:spLocks noGrp="1"/>
+          </p:cNvSpPr>
+          <p:nvPr>
+            <p:ph type="body" idx="1"/>
+          </p:nvPr>
+        </p:nvSpPr>
+        <p:spPr/>
+        <p:txBody>
+          <a:bodyPr/>
+          <a:lstStyle/>
+          <a:p>
+            <a:r>
+              <a:rPr lang="en-US" dirty="0" smtClean="0"/>
+              <a:t>ah</a:t>
+            </a:r>
+            <a:endParaRPr lang="en-US" dirty="0"/>
+          </a:p>
+        </p:txBody>
+      </p:sp>
+      <p:sp>
+        <p:nvSpPr>
+          <p:cNvPr id="4" name="Slide Number Placeholder 3"/>
+          <p:cNvSpPr>
+            <a:spLocks noGrp="1"/>
+          </p:cNvSpPr>
+          <p:nvPr>
+            <p:ph type="sldNum" sz="quarter" idx="10"/>
+          </p:nvPr>
+        </p:nvSpPr>
+        <p:spPr/>
+        <p:txBody>
+          <a:bodyPr/>
+          <a:lstStyle/>
+          <a:p>
+            <a:fld id="{7B91EEE6-72E6-42D7-884B-8721B2C32774}" type="slidenum">
+              <a:rPr lang="en-US" smtClean="0"/>
+              <a:t>17</a:t>
+            </a:fld>
+            <a:endParaRPr lang="en-US"/>
+          </a:p>
+        </p:txBody>
+      </p:sp>
+    </p:spTree>
+    <p:extLst>
+      <p:ext uri="{BB962C8B-B14F-4D97-AF65-F5344CB8AC3E}">
+        <p14:creationId xmlns:p14="http://schemas.microsoft.com/office/powerpoint/2010/main" val="854687939"/>
+      </p:ext>
+    </p:extLst>
+  </p:cSld>
+  <p:clrMapOvr>
+    <a:masterClrMapping/>
+  </p:clrMapOvr>
+</p:notes>
+</file>
+
+<file path=ppt/notesSlides/notesSlide18.xml><?xml version="1.0" encoding="utf-8"?>
+<p:notes xmlns:a="http://schemas.openxmlformats.org/drawingml/2006/main" xmlns:r="http://schemas.openxmlformats.org/officeDocument/2006/relationships" xmlns:p="http://schemas.openxmlformats.org/presentationml/2006/main">
+  <p:cSld>
+    <p:spTree>
+      <p:nvGrpSpPr>
+        <p:cNvPr id="1" name=""/>
+        <p:cNvGrpSpPr/>
+        <p:nvPr/>
+      </p:nvGrpSpPr>
+      <p:grpSpPr>
+        <a:xfrm>
+          <a:off x="0" y="0"/>
+          <a:ext cx="0" cy="0"/>
+          <a:chOff x="0" y="0"/>
+          <a:chExt cx="0" cy="0"/>
+        </a:xfrm>
+      </p:grpSpPr>
+      <p:sp>
+        <p:nvSpPr>
+          <p:cNvPr id="2" name="Slide Image Placeholder 1"/>
+          <p:cNvSpPr>
+            <a:spLocks noGrp="1" noRot="1" noChangeAspect="1"/>
+          </p:cNvSpPr>
+          <p:nvPr>
+            <p:ph type="sldImg"/>
+          </p:nvPr>
+        </p:nvSpPr>
+        <p:spPr/>
+      </p:sp>
+      <p:sp>
+        <p:nvSpPr>
+          <p:cNvPr id="3" name="Notes Placeholder 2"/>
+          <p:cNvSpPr>
+            <a:spLocks noGrp="1"/>
+          </p:cNvSpPr>
+          <p:nvPr>
+            <p:ph type="body" idx="1"/>
+          </p:nvPr>
+        </p:nvSpPr>
+        <p:spPr/>
+        <p:txBody>
+          <a:bodyPr/>
+          <a:lstStyle/>
+          <a:p>
+            <a:r>
+              <a:rPr lang="en-US" dirty="0" err="1" smtClean="0"/>
+              <a:t>cs</a:t>
+            </a:r>
+            <a:endParaRPr lang="en-US" dirty="0"/>
+          </a:p>
+        </p:txBody>
+      </p:sp>
+      <p:sp>
+        <p:nvSpPr>
+          <p:cNvPr id="4" name="Slide Number Placeholder 3"/>
+          <p:cNvSpPr>
+            <a:spLocks noGrp="1"/>
+          </p:cNvSpPr>
+          <p:nvPr>
+            <p:ph type="sldNum" sz="quarter" idx="10"/>
+          </p:nvPr>
+        </p:nvSpPr>
+        <p:spPr/>
+        <p:txBody>
+          <a:bodyPr/>
+          <a:lstStyle/>
+          <a:p>
+            <a:fld id="{7B91EEE6-72E6-42D7-884B-8721B2C32774}" type="slidenum">
+              <a:rPr lang="en-US" smtClean="0"/>
+              <a:t>18</a:t>
+            </a:fld>
+            <a:endParaRPr lang="en-US"/>
+          </a:p>
+        </p:txBody>
+      </p:sp>
+    </p:spTree>
+    <p:extLst>
+      <p:ext uri="{BB962C8B-B14F-4D97-AF65-F5344CB8AC3E}">
+        <p14:creationId xmlns:p14="http://schemas.microsoft.com/office/powerpoint/2010/main" val="521294893"/>
+      </p:ext>
+    </p:extLst>
+  </p:cSld>
+  <p:clrMapOvr>
+    <a:masterClrMapping/>
+  </p:clrMapOvr>
+</p:notes>
+</file>
+
+<file path=ppt/notesSlides/notesSlide19.xml><?xml version="1.0" encoding="utf-8"?>
+<p:notes xmlns:a="http://schemas.openxmlformats.org/drawingml/2006/main" xmlns:r="http://schemas.openxmlformats.org/officeDocument/2006/relationships" xmlns:p="http://schemas.openxmlformats.org/presentationml/2006/main">
+  <p:cSld>
+    <p:spTree>
+      <p:nvGrpSpPr>
+        <p:cNvPr id="1" name=""/>
+        <p:cNvGrpSpPr/>
+        <p:nvPr/>
+      </p:nvGrpSpPr>
+      <p:grpSpPr>
+        <a:xfrm>
+          <a:off x="0" y="0"/>
+          <a:ext cx="0" cy="0"/>
+          <a:chOff x="0" y="0"/>
+          <a:chExt cx="0" cy="0"/>
+        </a:xfrm>
+      </p:grpSpPr>
+      <p:sp>
+        <p:nvSpPr>
+          <p:cNvPr id="2" name="Slide Image Placeholder 1"/>
+          <p:cNvSpPr>
+            <a:spLocks noGrp="1" noRot="1" noChangeAspect="1"/>
+          </p:cNvSpPr>
+          <p:nvPr>
+            <p:ph type="sldImg"/>
+          </p:nvPr>
+        </p:nvSpPr>
+        <p:spPr/>
+      </p:sp>
+      <p:sp>
+        <p:nvSpPr>
+          <p:cNvPr id="3" name="Notes Placeholder 2"/>
+          <p:cNvSpPr>
+            <a:spLocks noGrp="1"/>
+          </p:cNvSpPr>
+          <p:nvPr>
+            <p:ph type="body" idx="1"/>
+          </p:nvPr>
+        </p:nvSpPr>
+        <p:spPr/>
+        <p:txBody>
+          <a:bodyPr/>
+          <a:lstStyle/>
+          <a:p>
+            <a:r>
+              <a:rPr lang="en-US" dirty="0" err="1" smtClean="0"/>
+              <a:t>cs</a:t>
+            </a:r>
+            <a:endParaRPr lang="en-US" dirty="0"/>
+          </a:p>
+        </p:txBody>
+      </p:sp>
+      <p:sp>
+        <p:nvSpPr>
+          <p:cNvPr id="4" name="Slide Number Placeholder 3"/>
+          <p:cNvSpPr>
+            <a:spLocks noGrp="1"/>
+          </p:cNvSpPr>
+          <p:nvPr>
+            <p:ph type="sldNum" sz="quarter" idx="10"/>
+          </p:nvPr>
+        </p:nvSpPr>
+        <p:spPr/>
+        <p:txBody>
+          <a:bodyPr/>
+          <a:lstStyle/>
+          <a:p>
+            <a:fld id="{7B91EEE6-72E6-42D7-884B-8721B2C32774}" type="slidenum">
+              <a:rPr lang="en-US" smtClean="0"/>
+              <a:t>19</a:t>
             </a:fld>
             <a:endParaRPr lang="en-US"/>
           </a:p>
@@ -1892,14 +2215,6 @@
             <a:r>
               <a:rPr lang="en-US" dirty="0" err="1" smtClean="0"/>
               <a:t>cs</a:t>
-            </a:r>
-            <a:r>
-              <a:rPr lang="en-US" baseline="0" dirty="0" smtClean="0"/>
-              <a:t> and </a:t>
-            </a:r>
-            <a:r>
-              <a:rPr lang="en-US" dirty="0" smtClean="0"/>
-              <a:t>ah</a:t>
             </a:r>
             <a:endParaRPr lang="en-US" dirty="0"/>
           </a:p>
@@ -2072,7 +2387,7 @@
           <a:p>
             <a:fld id="{043B6D9D-4A40-468E-8A55-76E991955273}" type="datetimeFigureOut">
               <a:rPr lang="en-US" smtClean="0"/>
-              <a:t>4/18/2016</a:t>
+              <a:t>4/22/2016</a:t>
             </a:fld>
             <a:endParaRPr lang="en-US"/>
           </a:p>
@@ -2242,7 +2557,7 @@
           <a:p>
             <a:fld id="{043B6D9D-4A40-468E-8A55-76E991955273}" type="datetimeFigureOut">
               <a:rPr lang="en-US" smtClean="0"/>
-              <a:t>4/18/2016</a:t>
+              <a:t>4/22/2016</a:t>
             </a:fld>
             <a:endParaRPr lang="en-US"/>
           </a:p>
@@ -2422,7 +2737,7 @@
           <a:p>
             <a:fld id="{043B6D9D-4A40-468E-8A55-76E991955273}" type="datetimeFigureOut">
               <a:rPr lang="en-US" smtClean="0"/>
-              <a:t>4/18/2016</a:t>
+              <a:t>4/22/2016</a:t>
             </a:fld>
             <a:endParaRPr lang="en-US"/>
           </a:p>
@@ -2592,7 +2907,7 @@
           <a:p>
             <a:fld id="{043B6D9D-4A40-468E-8A55-76E991955273}" type="datetimeFigureOut">
               <a:rPr lang="en-US" smtClean="0"/>
-              <a:t>4/18/2016</a:t>
+              <a:t>4/22/2016</a:t>
             </a:fld>
             <a:endParaRPr lang="en-US"/>
           </a:p>
@@ -2838,7 +3153,7 @@
           <a:p>
             <a:fld id="{043B6D9D-4A40-468E-8A55-76E991955273}" type="datetimeFigureOut">
               <a:rPr lang="en-US" smtClean="0"/>
-              <a:t>4/18/2016</a:t>
+              <a:t>4/22/2016</a:t>
             </a:fld>
             <a:endParaRPr lang="en-US"/>
           </a:p>
@@ -3070,7 +3385,7 @@
           <a:p>
             <a:fld id="{043B6D9D-4A40-468E-8A55-76E991955273}" type="datetimeFigureOut">
               <a:rPr lang="en-US" smtClean="0"/>
-              <a:t>4/18/2016</a:t>
+              <a:t>4/22/2016</a:t>
             </a:fld>
             <a:endParaRPr lang="en-US"/>
           </a:p>
@@ -3437,7 +3752,7 @@
           <a:p>
             <a:fld id="{043B6D9D-4A40-468E-8A55-76E991955273}" type="datetimeFigureOut">
               <a:rPr lang="en-US" smtClean="0"/>
-              <a:t>4/18/2016</a:t>
+              <a:t>4/22/2016</a:t>
             </a:fld>
             <a:endParaRPr lang="en-US"/>
           </a:p>
@@ -3555,7 +3870,7 @@
           <a:p>
             <a:fld id="{043B6D9D-4A40-468E-8A55-76E991955273}" type="datetimeFigureOut">
               <a:rPr lang="en-US" smtClean="0"/>
-              <a:t>4/18/2016</a:t>
+              <a:t>4/22/2016</a:t>
             </a:fld>
             <a:endParaRPr lang="en-US"/>
           </a:p>
@@ -3650,7 +3965,7 @@
           <a:p>
             <a:fld id="{043B6D9D-4A40-468E-8A55-76E991955273}" type="datetimeFigureOut">
               <a:rPr lang="en-US" smtClean="0"/>
-              <a:t>4/18/2016</a:t>
+              <a:t>4/22/2016</a:t>
             </a:fld>
             <a:endParaRPr lang="en-US"/>
           </a:p>
@@ -3927,7 +4242,7 @@
           <a:p>
             <a:fld id="{043B6D9D-4A40-468E-8A55-76E991955273}" type="datetimeFigureOut">
               <a:rPr lang="en-US" smtClean="0"/>
-              <a:t>4/18/2016</a:t>
+              <a:t>4/22/2016</a:t>
             </a:fld>
             <a:endParaRPr lang="en-US"/>
           </a:p>
@@ -4184,7 +4499,7 @@
           <a:p>
             <a:fld id="{043B6D9D-4A40-468E-8A55-76E991955273}" type="datetimeFigureOut">
               <a:rPr lang="en-US" smtClean="0"/>
-              <a:t>4/18/2016</a:t>
+              <a:t>4/22/2016</a:t>
             </a:fld>
             <a:endParaRPr lang="en-US"/>
           </a:p>
@@ -4397,7 +4712,7 @@
           <a:p>
             <a:fld id="{043B6D9D-4A40-468E-8A55-76E991955273}" type="datetimeFigureOut">
               <a:rPr lang="en-US" smtClean="0"/>
-              <a:t>4/18/2016</a:t>
+              <a:t>4/22/2016</a:t>
             </a:fld>
             <a:endParaRPr lang="en-US"/>
           </a:p>
@@ -5821,8 +6136,8 @@
         </p:blipFill>
         <p:spPr>
           <a:xfrm>
-            <a:off x="30556200" y="8991600"/>
-            <a:ext cx="16687800" cy="12420600"/>
+            <a:off x="29260800" y="8229600"/>
+            <a:ext cx="19349658" cy="14401800"/>
           </a:xfrm>
           <a:prstGeom prst="rect">
             <a:avLst/>
@@ -6072,7 +6387,7 @@
       </p:sp>
       <p:pic>
         <p:nvPicPr>
-          <p:cNvPr id="3" name="Picture 2"/>
+          <p:cNvPr id="9" name="Picture 8"/>
           <p:cNvPicPr>
             <a:picLocks noChangeAspect="1"/>
           </p:cNvPicPr>
@@ -6092,156 +6407,47 @@
         </p:blipFill>
         <p:spPr>
           <a:xfrm>
-            <a:off x="4375794" y="15979749"/>
-            <a:ext cx="14897996" cy="11292110"/>
+            <a:off x="5447404" y="6626080"/>
+            <a:ext cx="38785800" cy="19643826"/>
           </a:xfrm>
           <a:prstGeom prst="rect">
             <a:avLst/>
           </a:prstGeom>
-          <a:ln w="190500" cap="sq">
+          <a:solidFill>
+            <a:srgbClr val="FFFFFF">
+              <a:shade val="85000"/>
+            </a:srgbClr>
+          </a:solidFill>
+          <a:ln w="190500" cap="rnd">
             <a:solidFill>
-              <a:srgbClr val="C8C6BD"/>
+              <a:srgbClr val="FFFFFF"/>
             </a:solidFill>
-            <a:prstDash val="solid"/>
-            <a:miter lim="800000"/>
           </a:ln>
           <a:effectLst>
-            <a:outerShdw blurRad="254000" algn="bl" rotWithShape="0">
+            <a:outerShdw blurRad="50000" algn="tl" rotWithShape="0">
               <a:srgbClr val="000000">
-                <a:alpha val="43000"/>
+                <a:alpha val="41000"/>
               </a:srgbClr>
             </a:outerShdw>
           </a:effectLst>
           <a:scene3d>
-            <a:camera prst="perspectiveFront" fov="5400000"/>
-            <a:lightRig rig="threePt" dir="t">
-              <a:rot lat="0" lon="0" rev="2100000"/>
+            <a:camera prst="orthographicFront"/>
+            <a:lightRig rig="twoPt" dir="t">
+              <a:rot lat="0" lon="0" rev="7800000"/>
             </a:lightRig>
           </a:scene3d>
-          <a:sp3d extrusionH="25400">
-            <a:bevelT w="304800" h="152400" prst="hardEdge"/>
-            <a:extrusionClr>
-              <a:srgbClr val="000000"/>
-            </a:extrusionClr>
-          </a:sp3d>
-        </p:spPr>
-      </p:pic>
-      <p:pic>
-        <p:nvPicPr>
-          <p:cNvPr id="5" name="Picture 4"/>
-          <p:cNvPicPr>
-            <a:picLocks noChangeAspect="1"/>
-          </p:cNvPicPr>
-          <p:nvPr/>
-        </p:nvPicPr>
-        <p:blipFill>
-          <a:blip r:embed="rId5">
-            <a:extLst>
-              <a:ext uri="{28A0092B-C50C-407E-A947-70E740481C1C}">
-                <a14:useLocalDpi xmlns:a14="http://schemas.microsoft.com/office/drawing/2010/main" val="0"/>
-              </a:ext>
-            </a:extLst>
-          </a:blip>
-          <a:stretch>
-            <a:fillRect/>
-          </a:stretch>
-        </p:blipFill>
-        <p:spPr>
-          <a:xfrm>
-            <a:off x="2286000" y="5808479"/>
-            <a:ext cx="19077584" cy="9662215"/>
-          </a:xfrm>
-          <a:prstGeom prst="rect">
-            <a:avLst/>
-          </a:prstGeom>
-          <a:ln w="190500" cap="sq">
-            <a:solidFill>
-              <a:srgbClr val="C8C6BD"/>
-            </a:solidFill>
-            <a:prstDash val="solid"/>
-            <a:miter lim="800000"/>
-          </a:ln>
-          <a:effectLst>
-            <a:outerShdw blurRad="254000" algn="bl" rotWithShape="0">
-              <a:srgbClr val="000000">
-                <a:alpha val="43000"/>
-              </a:srgbClr>
-            </a:outerShdw>
-          </a:effectLst>
-          <a:scene3d>
-            <a:camera prst="perspectiveFront" fov="5400000"/>
-            <a:lightRig rig="threePt" dir="t">
-              <a:rot lat="0" lon="0" rev="2100000"/>
-            </a:lightRig>
-          </a:scene3d>
-          <a:sp3d extrusionH="25400">
-            <a:bevelT w="304800" h="152400" prst="hardEdge"/>
-            <a:extrusionClr>
-              <a:srgbClr val="000000"/>
-            </a:extrusionClr>
-          </a:sp3d>
-        </p:spPr>
-      </p:pic>
-      <p:pic>
-        <p:nvPicPr>
-          <p:cNvPr id="7" name="Picture 6"/>
-          <p:cNvPicPr>
-            <a:picLocks noChangeAspect="1"/>
-          </p:cNvPicPr>
-          <p:nvPr/>
-        </p:nvPicPr>
-        <p:blipFill>
-          <a:blip r:embed="rId6">
-            <a:extLst>
-              <a:ext uri="{28A0092B-C50C-407E-A947-70E740481C1C}">
-                <a14:useLocalDpi xmlns:a14="http://schemas.microsoft.com/office/drawing/2010/main" val="0"/>
-              </a:ext>
-            </a:extLst>
-          </a:blip>
-          <a:stretch>
-            <a:fillRect/>
-          </a:stretch>
-        </p:blipFill>
-        <p:spPr>
-          <a:xfrm>
-            <a:off x="28117800" y="7764210"/>
-            <a:ext cx="14874750" cy="17475904"/>
-          </a:xfrm>
-          <a:prstGeom prst="rect">
-            <a:avLst/>
-          </a:prstGeom>
-          <a:ln w="190500" cap="sq">
-            <a:solidFill>
-              <a:srgbClr val="C8C6BD"/>
-            </a:solidFill>
-            <a:prstDash val="solid"/>
-            <a:miter lim="800000"/>
-          </a:ln>
-          <a:effectLst>
-            <a:outerShdw blurRad="254000" algn="bl" rotWithShape="0">
-              <a:srgbClr val="000000">
-                <a:alpha val="43000"/>
-              </a:srgbClr>
-            </a:outerShdw>
-          </a:effectLst>
-          <a:scene3d>
-            <a:camera prst="perspectiveFront" fov="5400000"/>
-            <a:lightRig rig="threePt" dir="t">
-              <a:rot lat="0" lon="0" rev="2100000"/>
-            </a:lightRig>
-          </a:scene3d>
-          <a:sp3d extrusionH="25400">
-            <a:bevelT w="304800" h="152400" prst="hardEdge"/>
-            <a:extrusionClr>
-              <a:srgbClr val="000000"/>
-            </a:extrusionClr>
+          <a:sp3d contourW="6350">
+            <a:bevelT w="50800" h="16510"/>
+            <a:contourClr>
+              <a:srgbClr val="C0C0C0"/>
+            </a:contourClr>
           </a:sp3d>
         </p:spPr>
       </p:pic>
     </p:spTree>
     <p:extLst>
       <p:ext uri="{BB962C8B-B14F-4D97-AF65-F5344CB8AC3E}">
-        <p14:creationId xmlns:p14="http://schemas.microsoft.com/office/powerpoint/2010/main" val="3462075775"/>
+        <p14:creationId xmlns:p14="http://schemas.microsoft.com/office/powerpoint/2010/main" val="2247664498"/>
       </p:ext>
     </p:extLst>
   </p:cSld>
@@ -6399,7 +6605,7 @@
               <a:rPr lang="en-US" sz="26500" b="1" dirty="0" smtClean="0">
                 <a:latin typeface="+mj-lt"/>
               </a:rPr>
-              <a:t>Problems</a:t>
+              <a:t>Other Topologies</a:t>
             </a:r>
             <a:endParaRPr lang="en-US" sz="22100" b="1" dirty="0">
               <a:latin typeface="+mj-lt"/>
@@ -6450,193 +6656,30 @@
           </a:p>
         </p:txBody>
       </p:sp>
-      <p:sp>
-        <p:nvSpPr>
-          <p:cNvPr id="2" name="TextBox 1"/>
-          <p:cNvSpPr txBox="1"/>
-          <p:nvPr/>
-        </p:nvSpPr>
-        <p:spPr>
-          <a:xfrm>
-            <a:off x="2286000" y="6400800"/>
-            <a:ext cx="48234600" cy="19134341"/>
-          </a:xfrm>
-          <a:prstGeom prst="rect">
-            <a:avLst/>
-          </a:prstGeom>
-          <a:noFill/>
-        </p:spPr>
-        <p:txBody>
-          <a:bodyPr wrap="square" rtlCol="0">
-            <a:spAutoFit/>
-          </a:bodyPr>
-          <a:lstStyle/>
-          <a:p>
-            <a:pPr marL="857250" indent="-857250">
-              <a:buFont typeface="Arial" panose="020B0604020202020204" pitchFamily="34" charset="0"/>
-              <a:buChar char="•"/>
-            </a:pPr>
-            <a:r>
-              <a:rPr lang="en-US" sz="14500" dirty="0" err="1" smtClean="0"/>
-              <a:t>PcDuino</a:t>
-            </a:r>
-            <a:r>
-              <a:rPr lang="en-US" sz="14500" dirty="0" smtClean="0"/>
-              <a:t> </a:t>
-            </a:r>
-          </a:p>
-          <a:p>
-            <a:pPr marL="857250" indent="-857250">
-              <a:buFont typeface="Arial" panose="020B0604020202020204" pitchFamily="34" charset="0"/>
-              <a:buChar char="•"/>
-            </a:pPr>
-            <a:endParaRPr lang="en-US" sz="5000" dirty="0" smtClean="0"/>
-          </a:p>
-          <a:p>
-            <a:pPr marL="857250" indent="-857250">
-              <a:buFont typeface="Arial" panose="020B0604020202020204" pitchFamily="34" charset="0"/>
-              <a:buChar char="•"/>
-            </a:pPr>
-            <a:endParaRPr lang="en-US" sz="1000" dirty="0" smtClean="0"/>
-          </a:p>
-          <a:p>
-            <a:pPr marL="857250" indent="-857250">
-              <a:buFont typeface="Arial" panose="020B0604020202020204" pitchFamily="34" charset="0"/>
-              <a:buChar char="•"/>
-            </a:pPr>
-            <a:r>
-              <a:rPr lang="en-US" sz="14500" dirty="0" smtClean="0"/>
-              <a:t>Broken ODROIDS</a:t>
-            </a:r>
-          </a:p>
-          <a:p>
-            <a:pPr marL="857250" indent="-857250">
-              <a:buFont typeface="Arial" panose="020B0604020202020204" pitchFamily="34" charset="0"/>
-              <a:buChar char="•"/>
-            </a:pPr>
-            <a:endParaRPr lang="en-US" sz="5000" dirty="0" smtClean="0"/>
-          </a:p>
-          <a:p>
-            <a:pPr marL="857250" indent="-857250">
-              <a:buFont typeface="Arial" panose="020B0604020202020204" pitchFamily="34" charset="0"/>
-              <a:buChar char="•"/>
-            </a:pPr>
-            <a:endParaRPr lang="en-US" sz="1000" dirty="0" smtClean="0"/>
-          </a:p>
-          <a:p>
-            <a:pPr marL="857250" indent="-857250">
-              <a:buFont typeface="Arial" panose="020B0604020202020204" pitchFamily="34" charset="0"/>
-              <a:buChar char="•"/>
-            </a:pPr>
-            <a:r>
-              <a:rPr lang="en-US" sz="14500" dirty="0" err="1" smtClean="0"/>
-              <a:t>WiringPi</a:t>
-            </a:r>
-            <a:r>
-              <a:rPr lang="en-US" sz="14500" dirty="0" smtClean="0"/>
-              <a:t> requiring to update the kernel</a:t>
-            </a:r>
-          </a:p>
-          <a:p>
-            <a:pPr marL="857250" indent="-857250">
-              <a:buFont typeface="Arial" panose="020B0604020202020204" pitchFamily="34" charset="0"/>
-              <a:buChar char="•"/>
-            </a:pPr>
-            <a:endParaRPr lang="en-US" sz="5000" dirty="0" smtClean="0"/>
-          </a:p>
-          <a:p>
-            <a:pPr marL="857250" indent="-857250">
-              <a:buFont typeface="Arial" panose="020B0604020202020204" pitchFamily="34" charset="0"/>
-              <a:buChar char="•"/>
-            </a:pPr>
-            <a:endParaRPr lang="en-US" sz="1000" dirty="0" smtClean="0"/>
-          </a:p>
-          <a:p>
-            <a:pPr marL="857250" indent="-857250">
-              <a:buFont typeface="Arial" panose="020B0604020202020204" pitchFamily="34" charset="0"/>
-              <a:buChar char="•"/>
-            </a:pPr>
-            <a:r>
-              <a:rPr lang="en-US" sz="14500" dirty="0" smtClean="0"/>
-              <a:t>USB to USB connection is impossible</a:t>
-            </a:r>
-          </a:p>
-          <a:p>
-            <a:pPr marL="857250" indent="-857250">
-              <a:buFont typeface="Arial" panose="020B0604020202020204" pitchFamily="34" charset="0"/>
-              <a:buChar char="•"/>
-            </a:pPr>
-            <a:endParaRPr lang="en-US" sz="5000" dirty="0" smtClean="0"/>
-          </a:p>
-          <a:p>
-            <a:pPr marL="857250" indent="-857250">
-              <a:buFont typeface="Arial" panose="020B0604020202020204" pitchFamily="34" charset="0"/>
-              <a:buChar char="•"/>
-            </a:pPr>
-            <a:endParaRPr lang="en-US" sz="1000" dirty="0" smtClean="0"/>
-          </a:p>
-          <a:p>
-            <a:pPr marL="857250" indent="-857250">
-              <a:buFont typeface="Arial" panose="020B0604020202020204" pitchFamily="34" charset="0"/>
-              <a:buChar char="•"/>
-            </a:pPr>
-            <a:r>
-              <a:rPr lang="en-US" sz="14500" dirty="0" smtClean="0"/>
-              <a:t>GPIO complexity and lack of speed</a:t>
-            </a:r>
-          </a:p>
-          <a:p>
-            <a:pPr marL="857250" indent="-857250">
-              <a:buFont typeface="Arial" panose="020B0604020202020204" pitchFamily="34" charset="0"/>
-              <a:buChar char="•"/>
-            </a:pPr>
-            <a:endParaRPr lang="en-US" sz="5000" dirty="0" smtClean="0"/>
-          </a:p>
-          <a:p>
-            <a:pPr marL="857250" indent="-857250">
-              <a:buFont typeface="Arial" panose="020B0604020202020204" pitchFamily="34" charset="0"/>
-              <a:buChar char="•"/>
-            </a:pPr>
-            <a:endParaRPr lang="en-US" sz="1000" dirty="0" smtClean="0"/>
-          </a:p>
-          <a:p>
-            <a:pPr marL="857250" indent="-857250">
-              <a:buFont typeface="Arial" panose="020B0604020202020204" pitchFamily="34" charset="0"/>
-              <a:buChar char="•"/>
-            </a:pPr>
-            <a:r>
-              <a:rPr lang="en-US" sz="14500" dirty="0" smtClean="0"/>
-              <a:t>LINPACK and multiple interfaces</a:t>
-            </a:r>
-          </a:p>
-          <a:p>
-            <a:endParaRPr lang="en-US" dirty="0"/>
-          </a:p>
-        </p:txBody>
-      </p:sp>
       <p:pic>
         <p:nvPicPr>
-          <p:cNvPr id="3" name="Picture 2"/>
+          <p:cNvPr id="7" name="Picture 6"/>
           <p:cNvPicPr>
             <a:picLocks noChangeAspect="1"/>
           </p:cNvPicPr>
           <p:nvPr/>
         </p:nvPicPr>
-        <p:blipFill rotWithShape="1">
-          <a:blip r:embed="rId4" cstate="print">
+        <p:blipFill>
+          <a:blip r:embed="rId4">
             <a:extLst>
               <a:ext uri="{28A0092B-C50C-407E-A947-70E740481C1C}">
                 <a14:useLocalDpi xmlns:a14="http://schemas.microsoft.com/office/drawing/2010/main" val="0"/>
               </a:ext>
             </a:extLst>
           </a:blip>
-          <a:srcRect t="9848" b="7576"/>
-          <a:stretch/>
+          <a:stretch>
+            <a:fillRect/>
+          </a:stretch>
         </p:blipFill>
         <p:spPr>
           <a:xfrm>
-            <a:off x="34366200" y="7511900"/>
-            <a:ext cx="11529906" cy="16912140"/>
+            <a:off x="16655415" y="5928791"/>
+            <a:ext cx="17907000" cy="21038405"/>
           </a:xfrm>
           <a:prstGeom prst="rect">
             <a:avLst/>
@@ -6675,7 +6718,7 @@
     </p:spTree>
     <p:extLst>
       <p:ext uri="{BB962C8B-B14F-4D97-AF65-F5344CB8AC3E}">
-        <p14:creationId xmlns:p14="http://schemas.microsoft.com/office/powerpoint/2010/main" val="392308490"/>
+        <p14:creationId xmlns:p14="http://schemas.microsoft.com/office/powerpoint/2010/main" val="3462075775"/>
       </p:ext>
     </p:extLst>
   </p:cSld>
@@ -6833,7 +6876,7 @@
               <a:rPr lang="en-US" sz="26500" b="1" dirty="0" smtClean="0">
                 <a:latin typeface="+mj-lt"/>
               </a:rPr>
-              <a:t>Results</a:t>
+              <a:t>Other Topologies</a:t>
             </a:r>
             <a:endParaRPr lang="en-US" sz="22100" b="1" dirty="0">
               <a:latin typeface="+mj-lt"/>
@@ -6884,112 +6927,16 @@
           </a:p>
         </p:txBody>
       </p:sp>
-      <p:sp>
-        <p:nvSpPr>
-          <p:cNvPr id="2" name="TextBox 1"/>
-          <p:cNvSpPr txBox="1"/>
-          <p:nvPr/>
-        </p:nvSpPr>
-        <p:spPr>
-          <a:xfrm>
-            <a:off x="2021305" y="7086600"/>
-            <a:ext cx="49149000" cy="13455863"/>
-          </a:xfrm>
-          <a:prstGeom prst="rect">
-            <a:avLst/>
-          </a:prstGeom>
-          <a:noFill/>
-        </p:spPr>
-        <p:txBody>
-          <a:bodyPr wrap="square" rtlCol="0">
-            <a:spAutoFit/>
-          </a:bodyPr>
-          <a:lstStyle/>
-          <a:p>
-            <a:pPr marL="857250" indent="-857250">
-              <a:buFont typeface="Arial" panose="020B0604020202020204" pitchFamily="34" charset="0"/>
-              <a:buChar char="•"/>
-            </a:pPr>
-            <a:r>
-              <a:rPr lang="en-US" sz="14500" dirty="0"/>
-              <a:t>Using 4 a7 core per node	</a:t>
-            </a:r>
-            <a:endParaRPr lang="en-US" sz="14500" dirty="0" smtClean="0"/>
-          </a:p>
-          <a:p>
-            <a:pPr marL="857250" indent="-857250">
-              <a:buFont typeface="Arial" panose="020B0604020202020204" pitchFamily="34" charset="0"/>
-              <a:buChar char="•"/>
-            </a:pPr>
-            <a:endParaRPr lang="en-US" sz="5000" dirty="0"/>
-          </a:p>
-          <a:p>
-            <a:pPr marL="857250" indent="-857250">
-              <a:buFont typeface="Arial" panose="020B0604020202020204" pitchFamily="34" charset="0"/>
-              <a:buChar char="•"/>
-            </a:pPr>
-            <a:r>
-              <a:rPr lang="en-US" sz="14500" dirty="0" smtClean="0"/>
-              <a:t>With </a:t>
-            </a:r>
-            <a:r>
-              <a:rPr lang="en-US" sz="14500" dirty="0"/>
-              <a:t>1 a15 core per node:</a:t>
-            </a:r>
-          </a:p>
-          <a:p>
-            <a:pPr marL="2854757" lvl="1" indent="-1143000">
-              <a:buFont typeface="Arial" panose="020B0604020202020204" pitchFamily="34" charset="0"/>
-              <a:buChar char="•"/>
-            </a:pPr>
-            <a:r>
-              <a:rPr lang="en-US" sz="12100" dirty="0" smtClean="0"/>
-              <a:t>17.05 gigaflops</a:t>
-            </a:r>
-          </a:p>
-          <a:p>
-            <a:endParaRPr lang="en-US" sz="5000" dirty="0"/>
-          </a:p>
-          <a:p>
-            <a:pPr marL="857250" indent="-857250">
-              <a:buFont typeface="Arial" panose="020B0604020202020204" pitchFamily="34" charset="0"/>
-              <a:buChar char="•"/>
-            </a:pPr>
-            <a:r>
-              <a:rPr lang="en-US" sz="14500" dirty="0" smtClean="0"/>
-              <a:t>With </a:t>
-            </a:r>
-            <a:r>
-              <a:rPr lang="en-US" sz="14500" dirty="0"/>
-              <a:t>2 a15 cores per node:</a:t>
-            </a:r>
-          </a:p>
-          <a:p>
-            <a:pPr marL="2854757" lvl="1" indent="-1143000">
-              <a:buFont typeface="Arial" panose="020B0604020202020204" pitchFamily="34" charset="0"/>
-              <a:buChar char="•"/>
-            </a:pPr>
-            <a:r>
-              <a:rPr lang="en-US" sz="12100" dirty="0" smtClean="0"/>
-              <a:t>26.23 gigaflops</a:t>
-            </a:r>
-            <a:endParaRPr lang="en-US" sz="12100" dirty="0"/>
-          </a:p>
-          <a:p>
-            <a:endParaRPr lang="en-US" dirty="0"/>
-          </a:p>
-        </p:txBody>
-      </p:sp>
       <p:pic>
         <p:nvPicPr>
-          <p:cNvPr id="7" name="Picture 6"/>
+          <p:cNvPr id="3" name="Picture 2"/>
           <p:cNvPicPr>
             <a:picLocks noChangeAspect="1"/>
           </p:cNvPicPr>
           <p:nvPr/>
         </p:nvPicPr>
         <p:blipFill>
-          <a:blip r:embed="rId4" cstate="print">
+          <a:blip r:embed="rId4">
             <a:extLst>
               <a:ext uri="{28A0092B-C50C-407E-A947-70E740481C1C}">
                 <a14:useLocalDpi xmlns:a14="http://schemas.microsoft.com/office/drawing/2010/main" val="0"/>
@@ -7002,18 +6949,47 @@
         </p:blipFill>
         <p:spPr>
           <a:xfrm>
-            <a:off x="25608915" y="8153400"/>
-            <a:ext cx="22367770" cy="13823282"/>
+            <a:off x="11854815" y="5997512"/>
+            <a:ext cx="27508200" cy="20850162"/>
           </a:xfrm>
           <a:prstGeom prst="rect">
             <a:avLst/>
           </a:prstGeom>
+          <a:solidFill>
+            <a:srgbClr val="FFFFFF">
+              <a:shade val="85000"/>
+            </a:srgbClr>
+          </a:solidFill>
+          <a:ln w="190500" cap="rnd">
+            <a:solidFill>
+              <a:srgbClr val="FFFFFF"/>
+            </a:solidFill>
+          </a:ln>
+          <a:effectLst>
+            <a:outerShdw blurRad="50000" algn="tl" rotWithShape="0">
+              <a:srgbClr val="000000">
+                <a:alpha val="41000"/>
+              </a:srgbClr>
+            </a:outerShdw>
+          </a:effectLst>
+          <a:scene3d>
+            <a:camera prst="orthographicFront"/>
+            <a:lightRig rig="twoPt" dir="t">
+              <a:rot lat="0" lon="0" rev="7800000"/>
+            </a:lightRig>
+          </a:scene3d>
+          <a:sp3d contourW="6350">
+            <a:bevelT w="50800" h="16510"/>
+            <a:contourClr>
+              <a:srgbClr val="C0C0C0"/>
+            </a:contourClr>
+          </a:sp3d>
         </p:spPr>
       </p:pic>
     </p:spTree>
     <p:extLst>
       <p:ext uri="{BB962C8B-B14F-4D97-AF65-F5344CB8AC3E}">
-        <p14:creationId xmlns:p14="http://schemas.microsoft.com/office/powerpoint/2010/main" val="1176917578"/>
+        <p14:creationId xmlns:p14="http://schemas.microsoft.com/office/powerpoint/2010/main" val="4174487874"/>
       </p:ext>
     </p:extLst>
   </p:cSld>
@@ -7171,7 +7147,7 @@
               <a:rPr lang="en-US" sz="26500" b="1" dirty="0" smtClean="0">
                 <a:latin typeface="+mj-lt"/>
               </a:rPr>
-              <a:t>Future Projects</a:t>
+              <a:t>Networking</a:t>
             </a:r>
             <a:endParaRPr lang="en-US" sz="22100" b="1" dirty="0">
               <a:latin typeface="+mj-lt"/>
@@ -7224,14 +7200,14 @@
       </p:sp>
       <p:sp>
         <p:nvSpPr>
-          <p:cNvPr id="2" name="TextBox 1"/>
+          <p:cNvPr id="7" name="TextBox 6"/>
           <p:cNvSpPr txBox="1"/>
           <p:nvPr/>
         </p:nvSpPr>
         <p:spPr>
           <a:xfrm>
-            <a:off x="1600200" y="6629400"/>
-            <a:ext cx="49149000" cy="9362435"/>
+            <a:off x="2029326" y="6553200"/>
+            <a:ext cx="49149000" cy="6786473"/>
           </a:xfrm>
           <a:prstGeom prst="rect">
             <a:avLst/>
@@ -7239,7 +7215,7 @@
           <a:noFill/>
         </p:spPr>
         <p:txBody>
-          <a:bodyPr wrap="square" rtlCol="0">
+          <a:bodyPr wrap="square" numCol="2" rtlCol="0">
             <a:spAutoFit/>
           </a:bodyPr>
           <a:lstStyle/>
@@ -7250,7 +7226,7 @@
             </a:pPr>
             <a:r>
               <a:rPr lang="en-US" sz="14500" dirty="0" smtClean="0"/>
-              <a:t>Using for research for other research</a:t>
+              <a:t>IP Addresses</a:t>
             </a:r>
           </a:p>
           <a:p>
@@ -7258,44 +7234,152 @@
               <a:buFont typeface="Arial" panose="020B0604020202020204" pitchFamily="34" charset="0"/>
               <a:buChar char="•"/>
             </a:pPr>
-            <a:endParaRPr lang="en-US" sz="5000" dirty="0" smtClean="0"/>
+            <a:endParaRPr lang="en-US" sz="14500" dirty="0" smtClean="0"/>
           </a:p>
           <a:p>
             <a:pPr marL="1143000" indent="-1143000">
               <a:buFont typeface="Arial" panose="020B0604020202020204" pitchFamily="34" charset="0"/>
               <a:buChar char="•"/>
             </a:pPr>
-            <a:r>
-              <a:rPr lang="en-US" sz="14500" dirty="0" smtClean="0"/>
-              <a:t>Other connections</a:t>
-            </a:r>
+            <a:endParaRPr lang="en-US" sz="14500" dirty="0"/>
           </a:p>
           <a:p>
             <a:pPr marL="1143000" indent="-1143000">
               <a:buFont typeface="Arial" panose="020B0604020202020204" pitchFamily="34" charset="0"/>
               <a:buChar char="•"/>
             </a:pPr>
-            <a:endParaRPr lang="en-US" sz="5000" dirty="0" smtClean="0"/>
-          </a:p>
-          <a:p>
-            <a:pPr marL="1143000" indent="-1143000">
-              <a:buFont typeface="Arial" panose="020B0604020202020204" pitchFamily="34" charset="0"/>
-              <a:buChar char="•"/>
-            </a:pPr>
             <a:r>
               <a:rPr lang="en-US" sz="14500" dirty="0" smtClean="0"/>
-              <a:t>Perform problems</a:t>
-            </a:r>
+              <a:t>Routing tables</a:t>
+            </a:r>
+            <a:endParaRPr lang="en-US" sz="14500" dirty="0"/>
           </a:p>
           <a:p>
             <a:endParaRPr lang="en-US" dirty="0"/>
           </a:p>
         </p:txBody>
       </p:sp>
+      <p:pic>
+        <p:nvPicPr>
+          <p:cNvPr id="2" name="Picture 1"/>
+          <p:cNvPicPr>
+            <a:picLocks noChangeAspect="1"/>
+          </p:cNvPicPr>
+          <p:nvPr/>
+        </p:nvPicPr>
+        <p:blipFill>
+          <a:blip r:embed="rId4">
+            <a:extLst>
+              <a:ext uri="{28A0092B-C50C-407E-A947-70E740481C1C}">
+                <a14:useLocalDpi xmlns:a14="http://schemas.microsoft.com/office/drawing/2010/main" val="0"/>
+              </a:ext>
+            </a:extLst>
+          </a:blip>
+          <a:stretch>
+            <a:fillRect/>
+          </a:stretch>
+        </p:blipFill>
+        <p:spPr>
+          <a:xfrm>
+            <a:off x="24765000" y="9946436"/>
+            <a:ext cx="21307749" cy="11661883"/>
+          </a:xfrm>
+          <a:prstGeom prst="rect">
+            <a:avLst/>
+          </a:prstGeom>
+          <a:solidFill>
+            <a:srgbClr val="FFFFFF">
+              <a:shade val="85000"/>
+            </a:srgbClr>
+          </a:solidFill>
+          <a:ln w="190500" cap="rnd">
+            <a:solidFill>
+              <a:srgbClr val="FFFFFF"/>
+            </a:solidFill>
+          </a:ln>
+          <a:effectLst>
+            <a:outerShdw blurRad="50000" algn="tl" rotWithShape="0">
+              <a:srgbClr val="000000">
+                <a:alpha val="41000"/>
+              </a:srgbClr>
+            </a:outerShdw>
+          </a:effectLst>
+          <a:scene3d>
+            <a:camera prst="orthographicFront"/>
+            <a:lightRig rig="twoPt" dir="t">
+              <a:rot lat="0" lon="0" rev="7800000"/>
+            </a:lightRig>
+          </a:scene3d>
+          <a:sp3d contourW="6350">
+            <a:bevelT w="50800" h="16510"/>
+            <a:contourClr>
+              <a:srgbClr val="C0C0C0"/>
+            </a:contourClr>
+          </a:sp3d>
+        </p:spPr>
+      </p:pic>
+      <p:pic>
+        <p:nvPicPr>
+          <p:cNvPr id="3" name="Picture 2"/>
+          <p:cNvPicPr>
+            <a:picLocks noChangeAspect="1"/>
+          </p:cNvPicPr>
+          <p:nvPr/>
+        </p:nvPicPr>
+        <p:blipFill rotWithShape="1">
+          <a:blip r:embed="rId5">
+            <a:extLst>
+              <a:ext uri="{28A0092B-C50C-407E-A947-70E740481C1C}">
+                <a14:useLocalDpi xmlns:a14="http://schemas.microsoft.com/office/drawing/2010/main" val="0"/>
+              </a:ext>
+            </a:extLst>
+          </a:blip>
+          <a:srcRect l="1435" t="77761" r="53603"/>
+          <a:stretch/>
+        </p:blipFill>
+        <p:spPr>
+          <a:xfrm>
+            <a:off x="2029326" y="10689385"/>
+            <a:ext cx="17510960" cy="10175983"/>
+          </a:xfrm>
+          <a:prstGeom prst="rect">
+            <a:avLst/>
+          </a:prstGeom>
+          <a:solidFill>
+            <a:srgbClr val="FFFFFF">
+              <a:shade val="85000"/>
+            </a:srgbClr>
+          </a:solidFill>
+          <a:ln w="190500" cap="rnd">
+            <a:solidFill>
+              <a:srgbClr val="FFFFFF"/>
+            </a:solidFill>
+          </a:ln>
+          <a:effectLst>
+            <a:outerShdw blurRad="50000" algn="tl" rotWithShape="0">
+              <a:srgbClr val="000000">
+                <a:alpha val="41000"/>
+              </a:srgbClr>
+            </a:outerShdw>
+          </a:effectLst>
+          <a:scene3d>
+            <a:camera prst="orthographicFront"/>
+            <a:lightRig rig="twoPt" dir="t">
+              <a:rot lat="0" lon="0" rev="7800000"/>
+            </a:lightRig>
+          </a:scene3d>
+          <a:sp3d contourW="6350">
+            <a:bevelT w="50800" h="16510"/>
+            <a:contourClr>
+              <a:srgbClr val="C0C0C0"/>
+            </a:contourClr>
+          </a:sp3d>
+        </p:spPr>
+      </p:pic>
     </p:spTree>
     <p:extLst>
       <p:ext uri="{BB962C8B-B14F-4D97-AF65-F5344CB8AC3E}">
-        <p14:creationId xmlns:p14="http://schemas.microsoft.com/office/powerpoint/2010/main" val="2689254134"/>
+        <p14:creationId xmlns:p14="http://schemas.microsoft.com/office/powerpoint/2010/main" val="2426363647"/>
       </p:ext>
     </p:extLst>
   </p:cSld>
@@ -7453,7 +7537,7 @@
               <a:rPr lang="en-US" sz="26500" b="1" dirty="0" smtClean="0">
                 <a:latin typeface="+mj-lt"/>
               </a:rPr>
-              <a:t>Conclusion</a:t>
+              <a:t>Problems</a:t>
             </a:r>
             <a:endParaRPr lang="en-US" sz="22100" b="1" dirty="0">
               <a:latin typeface="+mj-lt"/>
@@ -7512,8 +7596,8 @@
         </p:nvSpPr>
         <p:spPr>
           <a:xfrm>
-            <a:off x="990600" y="5791200"/>
-            <a:ext cx="49149000" cy="1129412"/>
+            <a:off x="2286000" y="6400800"/>
+            <a:ext cx="48234600" cy="19134341"/>
           </a:xfrm>
           <a:prstGeom prst="rect">
             <a:avLst/>
@@ -7526,27 +7610,1149 @@
           </a:bodyPr>
           <a:lstStyle/>
           <a:p>
-            <a:r>
-              <a:rPr lang="en-US" dirty="0" smtClean="0"/>
-              <a:t>Conclusion </a:t>
-            </a:r>
-            <a:r>
-              <a:rPr lang="en-US" dirty="0" err="1" smtClean="0"/>
-              <a:t>conclusion</a:t>
-            </a:r>
-            <a:r>
-              <a:rPr lang="en-US" dirty="0" smtClean="0"/>
+            <a:pPr marL="857250" indent="-857250">
+              <a:buFont typeface="Arial" panose="020B0604020202020204" pitchFamily="34" charset="0"/>
+              <a:buChar char="•"/>
+            </a:pPr>
+            <a:r>
+              <a:rPr lang="en-US" sz="14500" dirty="0" err="1" smtClean="0"/>
+              <a:t>PcDuino</a:t>
+            </a:r>
+            <a:r>
+              <a:rPr lang="en-US" sz="14500" dirty="0" smtClean="0"/>
               <a:t> </a:t>
             </a:r>
-            <a:r>
-              <a:rPr lang="en-US" dirty="0" err="1" smtClean="0"/>
-              <a:t>conclusion</a:t>
-            </a:r>
-            <a:r>
-              <a:rPr lang="en-US" dirty="0" smtClean="0"/>
-              <a:t> </a:t>
-            </a:r>
+          </a:p>
+          <a:p>
+            <a:pPr marL="857250" indent="-857250">
+              <a:buFont typeface="Arial" panose="020B0604020202020204" pitchFamily="34" charset="0"/>
+              <a:buChar char="•"/>
+            </a:pPr>
+            <a:endParaRPr lang="en-US" sz="5000" dirty="0" smtClean="0"/>
+          </a:p>
+          <a:p>
+            <a:pPr marL="857250" indent="-857250">
+              <a:buFont typeface="Arial" panose="020B0604020202020204" pitchFamily="34" charset="0"/>
+              <a:buChar char="•"/>
+            </a:pPr>
+            <a:endParaRPr lang="en-US" sz="1000" dirty="0" smtClean="0"/>
+          </a:p>
+          <a:p>
+            <a:pPr marL="857250" indent="-857250">
+              <a:buFont typeface="Arial" panose="020B0604020202020204" pitchFamily="34" charset="0"/>
+              <a:buChar char="•"/>
+            </a:pPr>
+            <a:r>
+              <a:rPr lang="en-US" sz="14500" dirty="0" smtClean="0"/>
+              <a:t>Broken ODROIDS</a:t>
+            </a:r>
+          </a:p>
+          <a:p>
+            <a:pPr marL="857250" indent="-857250">
+              <a:buFont typeface="Arial" panose="020B0604020202020204" pitchFamily="34" charset="0"/>
+              <a:buChar char="•"/>
+            </a:pPr>
+            <a:endParaRPr lang="en-US" sz="5000" dirty="0" smtClean="0"/>
+          </a:p>
+          <a:p>
+            <a:pPr marL="857250" indent="-857250">
+              <a:buFont typeface="Arial" panose="020B0604020202020204" pitchFamily="34" charset="0"/>
+              <a:buChar char="•"/>
+            </a:pPr>
+            <a:endParaRPr lang="en-US" sz="1000" dirty="0" smtClean="0"/>
+          </a:p>
+          <a:p>
+            <a:pPr marL="857250" indent="-857250">
+              <a:buFont typeface="Arial" panose="020B0604020202020204" pitchFamily="34" charset="0"/>
+              <a:buChar char="•"/>
+            </a:pPr>
+            <a:r>
+              <a:rPr lang="en-US" sz="14500" dirty="0" err="1" smtClean="0"/>
+              <a:t>WiringPi</a:t>
+            </a:r>
+            <a:r>
+              <a:rPr lang="en-US" sz="14500" dirty="0" smtClean="0"/>
+              <a:t> requiring to update the kernel</a:t>
+            </a:r>
+          </a:p>
+          <a:p>
+            <a:pPr marL="857250" indent="-857250">
+              <a:buFont typeface="Arial" panose="020B0604020202020204" pitchFamily="34" charset="0"/>
+              <a:buChar char="•"/>
+            </a:pPr>
+            <a:endParaRPr lang="en-US" sz="5000" dirty="0" smtClean="0"/>
+          </a:p>
+          <a:p>
+            <a:pPr marL="857250" indent="-857250">
+              <a:buFont typeface="Arial" panose="020B0604020202020204" pitchFamily="34" charset="0"/>
+              <a:buChar char="•"/>
+            </a:pPr>
+            <a:endParaRPr lang="en-US" sz="1000" dirty="0" smtClean="0"/>
+          </a:p>
+          <a:p>
+            <a:pPr marL="857250" indent="-857250">
+              <a:buFont typeface="Arial" panose="020B0604020202020204" pitchFamily="34" charset="0"/>
+              <a:buChar char="•"/>
+            </a:pPr>
+            <a:r>
+              <a:rPr lang="en-US" sz="14500" dirty="0" smtClean="0"/>
+              <a:t>USB to USB connection is impossible</a:t>
+            </a:r>
+          </a:p>
+          <a:p>
+            <a:pPr marL="857250" indent="-857250">
+              <a:buFont typeface="Arial" panose="020B0604020202020204" pitchFamily="34" charset="0"/>
+              <a:buChar char="•"/>
+            </a:pPr>
+            <a:endParaRPr lang="en-US" sz="5000" dirty="0" smtClean="0"/>
+          </a:p>
+          <a:p>
+            <a:pPr marL="857250" indent="-857250">
+              <a:buFont typeface="Arial" panose="020B0604020202020204" pitchFamily="34" charset="0"/>
+              <a:buChar char="•"/>
+            </a:pPr>
+            <a:endParaRPr lang="en-US" sz="1000" dirty="0" smtClean="0"/>
+          </a:p>
+          <a:p>
+            <a:pPr marL="857250" indent="-857250">
+              <a:buFont typeface="Arial" panose="020B0604020202020204" pitchFamily="34" charset="0"/>
+              <a:buChar char="•"/>
+            </a:pPr>
+            <a:r>
+              <a:rPr lang="en-US" sz="14500" dirty="0" smtClean="0"/>
+              <a:t>GPIO complexity and lack of speed</a:t>
+            </a:r>
+          </a:p>
+          <a:p>
+            <a:pPr marL="857250" indent="-857250">
+              <a:buFont typeface="Arial" panose="020B0604020202020204" pitchFamily="34" charset="0"/>
+              <a:buChar char="•"/>
+            </a:pPr>
+            <a:endParaRPr lang="en-US" sz="5000" dirty="0" smtClean="0"/>
+          </a:p>
+          <a:p>
+            <a:pPr marL="857250" indent="-857250">
+              <a:buFont typeface="Arial" panose="020B0604020202020204" pitchFamily="34" charset="0"/>
+              <a:buChar char="•"/>
+            </a:pPr>
+            <a:endParaRPr lang="en-US" sz="1000" dirty="0" smtClean="0"/>
+          </a:p>
+          <a:p>
+            <a:pPr marL="857250" indent="-857250">
+              <a:buFont typeface="Arial" panose="020B0604020202020204" pitchFamily="34" charset="0"/>
+              <a:buChar char="•"/>
+            </a:pPr>
+            <a:r>
+              <a:rPr lang="en-US" sz="14500" dirty="0" smtClean="0"/>
+              <a:t>LINPACK and multiple interfaces</a:t>
+            </a:r>
+          </a:p>
+          <a:p>
             <a:endParaRPr lang="en-US" dirty="0"/>
+          </a:p>
+        </p:txBody>
+      </p:sp>
+      <p:pic>
+        <p:nvPicPr>
+          <p:cNvPr id="3" name="Picture 2"/>
+          <p:cNvPicPr>
+            <a:picLocks noChangeAspect="1"/>
+          </p:cNvPicPr>
+          <p:nvPr/>
+        </p:nvPicPr>
+        <p:blipFill rotWithShape="1">
+          <a:blip r:embed="rId4" cstate="print">
+            <a:extLst>
+              <a:ext uri="{28A0092B-C50C-407E-A947-70E740481C1C}">
+                <a14:useLocalDpi xmlns:a14="http://schemas.microsoft.com/office/drawing/2010/main" val="0"/>
+              </a:ext>
+            </a:extLst>
+          </a:blip>
+          <a:srcRect t="9848" b="7576"/>
+          <a:stretch/>
+        </p:blipFill>
+        <p:spPr>
+          <a:xfrm>
+            <a:off x="34366200" y="7511900"/>
+            <a:ext cx="11529906" cy="16912140"/>
+          </a:xfrm>
+          <a:prstGeom prst="rect">
+            <a:avLst/>
+          </a:prstGeom>
+          <a:solidFill>
+            <a:srgbClr val="FFFFFF">
+              <a:shade val="85000"/>
+            </a:srgbClr>
+          </a:solidFill>
+          <a:ln w="190500" cap="rnd">
+            <a:solidFill>
+              <a:srgbClr val="FFFFFF"/>
+            </a:solidFill>
+          </a:ln>
+          <a:effectLst>
+            <a:outerShdw blurRad="50000" algn="tl" rotWithShape="0">
+              <a:srgbClr val="000000">
+                <a:alpha val="41000"/>
+              </a:srgbClr>
+            </a:outerShdw>
+          </a:effectLst>
+          <a:scene3d>
+            <a:camera prst="orthographicFront"/>
+            <a:lightRig rig="twoPt" dir="t">
+              <a:rot lat="0" lon="0" rev="7800000"/>
+            </a:lightRig>
+          </a:scene3d>
+          <a:sp3d contourW="6350">
+            <a:bevelT w="50800" h="16510"/>
+            <a:contourClr>
+              <a:srgbClr val="C0C0C0"/>
+            </a:contourClr>
+          </a:sp3d>
+        </p:spPr>
+      </p:pic>
+    </p:spTree>
+    <p:extLst>
+      <p:ext uri="{BB962C8B-B14F-4D97-AF65-F5344CB8AC3E}">
+        <p14:creationId xmlns:p14="http://schemas.microsoft.com/office/powerpoint/2010/main" val="392308490"/>
+      </p:ext>
+    </p:extLst>
+  </p:cSld>
+  <p:clrMapOvr>
+    <a:masterClrMapping/>
+  </p:clrMapOvr>
+  <p:timing>
+    <p:tnLst>
+      <p:par>
+        <p:cTn id="1" dur="indefinite" restart="never" nodeType="tmRoot"/>
+      </p:par>
+    </p:tnLst>
+  </p:timing>
+</p:sld>
+</file>
+
+<file path=ppt/slides/slide17.xml><?xml version="1.0" encoding="utf-8"?>
+<p:sld xmlns:a="http://schemas.openxmlformats.org/drawingml/2006/main" xmlns:r="http://schemas.openxmlformats.org/officeDocument/2006/relationships" xmlns:p="http://schemas.openxmlformats.org/presentationml/2006/main">
+  <p:cSld>
+    <p:bg>
+      <p:bgPr>
+        <a:solidFill>
+          <a:schemeClr val="tx2">
+            <a:lumMod val="20000"/>
+            <a:lumOff val="80000"/>
+          </a:schemeClr>
+        </a:solidFill>
+        <a:effectLst/>
+      </p:bgPr>
+    </p:bg>
+    <p:spTree>
+      <p:nvGrpSpPr>
+        <p:cNvPr id="1" name=""/>
+        <p:cNvGrpSpPr/>
+        <p:nvPr/>
+      </p:nvGrpSpPr>
+      <p:grpSpPr>
+        <a:xfrm>
+          <a:off x="0" y="0"/>
+          <a:ext cx="0" cy="0"/>
+          <a:chOff x="0" y="0"/>
+          <a:chExt cx="0" cy="0"/>
+        </a:xfrm>
+      </p:grpSpPr>
+      <p:sp>
+        <p:nvSpPr>
+          <p:cNvPr id="6" name="Rectangle 5"/>
+          <p:cNvSpPr/>
+          <p:nvPr/>
+        </p:nvSpPr>
+        <p:spPr>
+          <a:xfrm>
+            <a:off x="11430" y="0"/>
+            <a:ext cx="51194970" cy="5082988"/>
+          </a:xfrm>
+          <a:prstGeom prst="rect">
+            <a:avLst/>
+          </a:prstGeom>
+          <a:solidFill>
+            <a:schemeClr val="accent1">
+              <a:lumMod val="60000"/>
+              <a:lumOff val="40000"/>
+            </a:schemeClr>
+          </a:solidFill>
+          <a:ln>
+            <a:noFill/>
+          </a:ln>
+        </p:spPr>
+        <p:style>
+          <a:lnRef idx="2">
+            <a:schemeClr val="accent1">
+              <a:shade val="50000"/>
+            </a:schemeClr>
+          </a:lnRef>
+          <a:fillRef idx="1">
+            <a:schemeClr val="accent1"/>
+          </a:fillRef>
+          <a:effectRef idx="0">
+            <a:schemeClr val="accent1"/>
+          </a:effectRef>
+          <a:fontRef idx="minor">
+            <a:schemeClr val="lt1"/>
+          </a:fontRef>
+        </p:style>
+        <p:txBody>
+          <a:bodyPr rtlCol="0" anchor="ctr"/>
+          <a:lstStyle/>
+          <a:p>
+            <a:pPr algn="ctr"/>
+            <a:endParaRPr lang="en-US" sz="6244"/>
+          </a:p>
+        </p:txBody>
+      </p:sp>
+      <p:pic>
+        <p:nvPicPr>
+          <p:cNvPr id="4" name="Picture 3"/>
+          <p:cNvPicPr>
+            <a:picLocks noChangeAspect="1"/>
+          </p:cNvPicPr>
+          <p:nvPr/>
+        </p:nvPicPr>
+        <p:blipFill>
+          <a:blip r:embed="rId3">
+            <a:extLst>
+              <a:ext uri="{28A0092B-C50C-407E-A947-70E740481C1C}">
+                <a14:useLocalDpi xmlns:a14="http://schemas.microsoft.com/office/drawing/2010/main" val="0"/>
+              </a:ext>
+            </a:extLst>
+          </a:blip>
+          <a:stretch>
+            <a:fillRect/>
+          </a:stretch>
+        </p:blipFill>
+        <p:spPr>
+          <a:xfrm>
+            <a:off x="11430" y="0"/>
+            <a:ext cx="5435974" cy="5082988"/>
+          </a:xfrm>
+          <a:prstGeom prst="rect">
+            <a:avLst/>
+          </a:prstGeom>
+        </p:spPr>
+      </p:pic>
+      <p:sp>
+        <p:nvSpPr>
+          <p:cNvPr id="12" name="TextBox 11"/>
+          <p:cNvSpPr txBox="1"/>
+          <p:nvPr/>
+        </p:nvSpPr>
+        <p:spPr>
+          <a:xfrm>
+            <a:off x="5029200" y="384974"/>
+            <a:ext cx="46177200" cy="4313040"/>
+          </a:xfrm>
+          <a:prstGeom prst="rect">
+            <a:avLst/>
+          </a:prstGeom>
+          <a:noFill/>
+          <a:ln>
+            <a:noFill/>
+          </a:ln>
+        </p:spPr>
+        <p:txBody>
+          <a:bodyPr wrap="square" rtlCol="0">
+            <a:spAutoFit/>
+          </a:bodyPr>
+          <a:lstStyle/>
+          <a:p>
+            <a:pPr algn="ctr"/>
+            <a:endParaRPr lang="en-US" sz="927" dirty="0"/>
+          </a:p>
+          <a:p>
+            <a:pPr algn="ctr"/>
+            <a:r>
+              <a:rPr lang="en-US" sz="26500" b="1" dirty="0" smtClean="0">
+                <a:latin typeface="+mj-lt"/>
+              </a:rPr>
+              <a:t>Results</a:t>
+            </a:r>
+            <a:endParaRPr lang="en-US" sz="22100" b="1" dirty="0">
+              <a:latin typeface="+mj-lt"/>
+            </a:endParaRPr>
+          </a:p>
+        </p:txBody>
+      </p:sp>
+      <p:sp>
+        <p:nvSpPr>
+          <p:cNvPr id="39" name="Rectangle 38"/>
+          <p:cNvSpPr/>
+          <p:nvPr/>
+        </p:nvSpPr>
+        <p:spPr>
+          <a:xfrm>
+            <a:off x="11430" y="27812999"/>
+            <a:ext cx="51194970" cy="797121"/>
+          </a:xfrm>
+          <a:prstGeom prst="rect">
+            <a:avLst/>
+          </a:prstGeom>
+          <a:solidFill>
+            <a:srgbClr val="00518E"/>
+          </a:solidFill>
+        </p:spPr>
+        <p:style>
+          <a:lnRef idx="2">
+            <a:schemeClr val="accent1">
+              <a:shade val="50000"/>
+            </a:schemeClr>
+          </a:lnRef>
+          <a:fillRef idx="1">
+            <a:schemeClr val="accent1"/>
+          </a:fillRef>
+          <a:effectRef idx="0">
+            <a:schemeClr val="accent1"/>
+          </a:effectRef>
+          <a:fontRef idx="minor">
+            <a:schemeClr val="lt1"/>
+          </a:fontRef>
+        </p:style>
+        <p:txBody>
+          <a:bodyPr rtlCol="0" anchor="ctr"/>
+          <a:lstStyle/>
+          <a:p>
+            <a:pPr algn="ctr"/>
+            <a:endParaRPr lang="en-US" sz="6244" dirty="0"/>
+          </a:p>
+        </p:txBody>
+      </p:sp>
+      <p:sp>
+        <p:nvSpPr>
+          <p:cNvPr id="2" name="TextBox 1"/>
+          <p:cNvSpPr txBox="1"/>
+          <p:nvPr/>
+        </p:nvSpPr>
+        <p:spPr>
+          <a:xfrm>
+            <a:off x="2057400" y="7768426"/>
+            <a:ext cx="49149000" cy="13455863"/>
+          </a:xfrm>
+          <a:prstGeom prst="rect">
+            <a:avLst/>
+          </a:prstGeom>
+          <a:noFill/>
+        </p:spPr>
+        <p:txBody>
+          <a:bodyPr wrap="square" rtlCol="0">
+            <a:spAutoFit/>
+          </a:bodyPr>
+          <a:lstStyle/>
+          <a:p>
+            <a:pPr marL="857250" indent="-857250">
+              <a:buFont typeface="Arial" panose="020B0604020202020204" pitchFamily="34" charset="0"/>
+              <a:buChar char="•"/>
+            </a:pPr>
+            <a:r>
+              <a:rPr lang="en-US" sz="14500" dirty="0"/>
+              <a:t>Using 4 </a:t>
+            </a:r>
+            <a:r>
+              <a:rPr lang="en-US" sz="14500" dirty="0" smtClean="0"/>
+              <a:t>A7 core </a:t>
+            </a:r>
+            <a:r>
+              <a:rPr lang="en-US" sz="14500" dirty="0"/>
+              <a:t>per node	</a:t>
+            </a:r>
+            <a:endParaRPr lang="en-US" sz="14500" dirty="0" smtClean="0"/>
+          </a:p>
+          <a:p>
+            <a:pPr marL="857250" indent="-857250">
+              <a:buFont typeface="Arial" panose="020B0604020202020204" pitchFamily="34" charset="0"/>
+              <a:buChar char="•"/>
+            </a:pPr>
+            <a:endParaRPr lang="en-US" sz="5000" dirty="0"/>
+          </a:p>
+          <a:p>
+            <a:pPr marL="857250" indent="-857250">
+              <a:buFont typeface="Arial" panose="020B0604020202020204" pitchFamily="34" charset="0"/>
+              <a:buChar char="•"/>
+            </a:pPr>
+            <a:r>
+              <a:rPr lang="en-US" sz="14500" dirty="0" smtClean="0"/>
+              <a:t>With </a:t>
+            </a:r>
+            <a:r>
+              <a:rPr lang="en-US" sz="14500" dirty="0"/>
+              <a:t>1 </a:t>
+            </a:r>
+            <a:r>
+              <a:rPr lang="en-US" sz="14500" dirty="0" smtClean="0"/>
+              <a:t>A15 </a:t>
+            </a:r>
+            <a:r>
+              <a:rPr lang="en-US" sz="14500" dirty="0"/>
+              <a:t>core per node:</a:t>
+            </a:r>
+          </a:p>
+          <a:p>
+            <a:pPr marL="2854757" lvl="1" indent="-1143000">
+              <a:buFont typeface="Arial" panose="020B0604020202020204" pitchFamily="34" charset="0"/>
+              <a:buChar char="•"/>
+            </a:pPr>
+            <a:r>
+              <a:rPr lang="en-US" sz="12100" dirty="0" smtClean="0"/>
+              <a:t>17.05 gigaflops</a:t>
+            </a:r>
+          </a:p>
+          <a:p>
+            <a:endParaRPr lang="en-US" sz="5000" dirty="0"/>
+          </a:p>
+          <a:p>
+            <a:pPr marL="857250" indent="-857250">
+              <a:buFont typeface="Arial" panose="020B0604020202020204" pitchFamily="34" charset="0"/>
+              <a:buChar char="•"/>
+            </a:pPr>
+            <a:r>
+              <a:rPr lang="en-US" sz="14500" dirty="0" smtClean="0"/>
+              <a:t>With </a:t>
+            </a:r>
+            <a:r>
+              <a:rPr lang="en-US" sz="14500" dirty="0"/>
+              <a:t>2 </a:t>
+            </a:r>
+            <a:r>
+              <a:rPr lang="en-US" sz="14500" dirty="0" smtClean="0"/>
+              <a:t>A15 </a:t>
+            </a:r>
+            <a:r>
+              <a:rPr lang="en-US" sz="14500" dirty="0"/>
+              <a:t>cores per node:</a:t>
+            </a:r>
+          </a:p>
+          <a:p>
+            <a:pPr marL="2854757" lvl="1" indent="-1143000">
+              <a:buFont typeface="Arial" panose="020B0604020202020204" pitchFamily="34" charset="0"/>
+              <a:buChar char="•"/>
+            </a:pPr>
+            <a:r>
+              <a:rPr lang="en-US" sz="12100" dirty="0" smtClean="0"/>
+              <a:t>26.23 gigaflops</a:t>
+            </a:r>
+            <a:endParaRPr lang="en-US" sz="12100" dirty="0"/>
+          </a:p>
+          <a:p>
+            <a:endParaRPr lang="en-US" dirty="0"/>
+          </a:p>
+        </p:txBody>
+      </p:sp>
+      <p:pic>
+        <p:nvPicPr>
+          <p:cNvPr id="7" name="Picture 6"/>
+          <p:cNvPicPr>
+            <a:picLocks noChangeAspect="1"/>
+          </p:cNvPicPr>
+          <p:nvPr/>
+        </p:nvPicPr>
+        <p:blipFill>
+          <a:blip r:embed="rId4" cstate="print">
+            <a:extLst>
+              <a:ext uri="{28A0092B-C50C-407E-A947-70E740481C1C}">
+                <a14:useLocalDpi xmlns:a14="http://schemas.microsoft.com/office/drawing/2010/main" val="0"/>
+              </a:ext>
+            </a:extLst>
+          </a:blip>
+          <a:stretch>
+            <a:fillRect/>
+          </a:stretch>
+        </p:blipFill>
+        <p:spPr>
+          <a:xfrm>
+            <a:off x="24769174" y="7768426"/>
+            <a:ext cx="24913226" cy="15396374"/>
+          </a:xfrm>
+          <a:prstGeom prst="rect">
+            <a:avLst/>
+          </a:prstGeom>
+        </p:spPr>
+      </p:pic>
+    </p:spTree>
+    <p:extLst>
+      <p:ext uri="{BB962C8B-B14F-4D97-AF65-F5344CB8AC3E}">
+        <p14:creationId xmlns:p14="http://schemas.microsoft.com/office/powerpoint/2010/main" val="1176917578"/>
+      </p:ext>
+    </p:extLst>
+  </p:cSld>
+  <p:clrMapOvr>
+    <a:masterClrMapping/>
+  </p:clrMapOvr>
+  <p:timing>
+    <p:tnLst>
+      <p:par>
+        <p:cTn id="1" dur="indefinite" restart="never" nodeType="tmRoot"/>
+      </p:par>
+    </p:tnLst>
+  </p:timing>
+</p:sld>
+</file>
+
+<file path=ppt/slides/slide18.xml><?xml version="1.0" encoding="utf-8"?>
+<p:sld xmlns:a="http://schemas.openxmlformats.org/drawingml/2006/main" xmlns:r="http://schemas.openxmlformats.org/officeDocument/2006/relationships" xmlns:p="http://schemas.openxmlformats.org/presentationml/2006/main">
+  <p:cSld>
+    <p:bg>
+      <p:bgPr>
+        <a:solidFill>
+          <a:schemeClr val="tx2">
+            <a:lumMod val="20000"/>
+            <a:lumOff val="80000"/>
+          </a:schemeClr>
+        </a:solidFill>
+        <a:effectLst/>
+      </p:bgPr>
+    </p:bg>
+    <p:spTree>
+      <p:nvGrpSpPr>
+        <p:cNvPr id="1" name=""/>
+        <p:cNvGrpSpPr/>
+        <p:nvPr/>
+      </p:nvGrpSpPr>
+      <p:grpSpPr>
+        <a:xfrm>
+          <a:off x="0" y="0"/>
+          <a:ext cx="0" cy="0"/>
+          <a:chOff x="0" y="0"/>
+          <a:chExt cx="0" cy="0"/>
+        </a:xfrm>
+      </p:grpSpPr>
+      <p:sp>
+        <p:nvSpPr>
+          <p:cNvPr id="6" name="Rectangle 5"/>
+          <p:cNvSpPr/>
+          <p:nvPr/>
+        </p:nvSpPr>
+        <p:spPr>
+          <a:xfrm>
+            <a:off x="11430" y="0"/>
+            <a:ext cx="51194970" cy="5082988"/>
+          </a:xfrm>
+          <a:prstGeom prst="rect">
+            <a:avLst/>
+          </a:prstGeom>
+          <a:solidFill>
+            <a:schemeClr val="accent1">
+              <a:lumMod val="60000"/>
+              <a:lumOff val="40000"/>
+            </a:schemeClr>
+          </a:solidFill>
+          <a:ln>
+            <a:noFill/>
+          </a:ln>
+        </p:spPr>
+        <p:style>
+          <a:lnRef idx="2">
+            <a:schemeClr val="accent1">
+              <a:shade val="50000"/>
+            </a:schemeClr>
+          </a:lnRef>
+          <a:fillRef idx="1">
+            <a:schemeClr val="accent1"/>
+          </a:fillRef>
+          <a:effectRef idx="0">
+            <a:schemeClr val="accent1"/>
+          </a:effectRef>
+          <a:fontRef idx="minor">
+            <a:schemeClr val="lt1"/>
+          </a:fontRef>
+        </p:style>
+        <p:txBody>
+          <a:bodyPr rtlCol="0" anchor="ctr"/>
+          <a:lstStyle/>
+          <a:p>
+            <a:pPr algn="ctr"/>
+            <a:endParaRPr lang="en-US" sz="6244"/>
+          </a:p>
+        </p:txBody>
+      </p:sp>
+      <p:pic>
+        <p:nvPicPr>
+          <p:cNvPr id="4" name="Picture 3"/>
+          <p:cNvPicPr>
+            <a:picLocks noChangeAspect="1"/>
+          </p:cNvPicPr>
+          <p:nvPr/>
+        </p:nvPicPr>
+        <p:blipFill>
+          <a:blip r:embed="rId3">
+            <a:extLst>
+              <a:ext uri="{28A0092B-C50C-407E-A947-70E740481C1C}">
+                <a14:useLocalDpi xmlns:a14="http://schemas.microsoft.com/office/drawing/2010/main" val="0"/>
+              </a:ext>
+            </a:extLst>
+          </a:blip>
+          <a:stretch>
+            <a:fillRect/>
+          </a:stretch>
+        </p:blipFill>
+        <p:spPr>
+          <a:xfrm>
+            <a:off x="11430" y="0"/>
+            <a:ext cx="5435974" cy="5082988"/>
+          </a:xfrm>
+          <a:prstGeom prst="rect">
+            <a:avLst/>
+          </a:prstGeom>
+        </p:spPr>
+      </p:pic>
+      <p:sp>
+        <p:nvSpPr>
+          <p:cNvPr id="12" name="TextBox 11"/>
+          <p:cNvSpPr txBox="1"/>
+          <p:nvPr/>
+        </p:nvSpPr>
+        <p:spPr>
+          <a:xfrm>
+            <a:off x="5029200" y="384974"/>
+            <a:ext cx="46177200" cy="4313040"/>
+          </a:xfrm>
+          <a:prstGeom prst="rect">
+            <a:avLst/>
+          </a:prstGeom>
+          <a:noFill/>
+          <a:ln>
+            <a:noFill/>
+          </a:ln>
+        </p:spPr>
+        <p:txBody>
+          <a:bodyPr wrap="square" rtlCol="0">
+            <a:spAutoFit/>
+          </a:bodyPr>
+          <a:lstStyle/>
+          <a:p>
+            <a:pPr algn="ctr"/>
+            <a:endParaRPr lang="en-US" sz="927" dirty="0"/>
+          </a:p>
+          <a:p>
+            <a:pPr algn="ctr"/>
+            <a:r>
+              <a:rPr lang="en-US" sz="26500" b="1" dirty="0" smtClean="0">
+                <a:latin typeface="+mj-lt"/>
+              </a:rPr>
+              <a:t>Future Projects</a:t>
+            </a:r>
+            <a:endParaRPr lang="en-US" sz="22100" b="1" dirty="0">
+              <a:latin typeface="+mj-lt"/>
+            </a:endParaRPr>
+          </a:p>
+        </p:txBody>
+      </p:sp>
+      <p:sp>
+        <p:nvSpPr>
+          <p:cNvPr id="39" name="Rectangle 38"/>
+          <p:cNvSpPr/>
+          <p:nvPr/>
+        </p:nvSpPr>
+        <p:spPr>
+          <a:xfrm>
+            <a:off x="11430" y="27812999"/>
+            <a:ext cx="51194970" cy="797121"/>
+          </a:xfrm>
+          <a:prstGeom prst="rect">
+            <a:avLst/>
+          </a:prstGeom>
+          <a:solidFill>
+            <a:srgbClr val="00518E"/>
+          </a:solidFill>
+        </p:spPr>
+        <p:style>
+          <a:lnRef idx="2">
+            <a:schemeClr val="accent1">
+              <a:shade val="50000"/>
+            </a:schemeClr>
+          </a:lnRef>
+          <a:fillRef idx="1">
+            <a:schemeClr val="accent1"/>
+          </a:fillRef>
+          <a:effectRef idx="0">
+            <a:schemeClr val="accent1"/>
+          </a:effectRef>
+          <a:fontRef idx="minor">
+            <a:schemeClr val="lt1"/>
+          </a:fontRef>
+        </p:style>
+        <p:txBody>
+          <a:bodyPr rtlCol="0" anchor="ctr"/>
+          <a:lstStyle/>
+          <a:p>
+            <a:pPr algn="ctr"/>
+            <a:endParaRPr lang="en-US" sz="6244" dirty="0"/>
+          </a:p>
+        </p:txBody>
+      </p:sp>
+      <p:sp>
+        <p:nvSpPr>
+          <p:cNvPr id="2" name="TextBox 1"/>
+          <p:cNvSpPr txBox="1"/>
+          <p:nvPr/>
+        </p:nvSpPr>
+        <p:spPr>
+          <a:xfrm>
+            <a:off x="1600200" y="6629400"/>
+            <a:ext cx="49149000" cy="9362435"/>
+          </a:xfrm>
+          <a:prstGeom prst="rect">
+            <a:avLst/>
+          </a:prstGeom>
+          <a:noFill/>
+        </p:spPr>
+        <p:txBody>
+          <a:bodyPr wrap="square" rtlCol="0">
+            <a:spAutoFit/>
+          </a:bodyPr>
+          <a:lstStyle/>
+          <a:p>
+            <a:pPr marL="1143000" indent="-1143000">
+              <a:buFont typeface="Arial" panose="020B0604020202020204" pitchFamily="34" charset="0"/>
+              <a:buChar char="•"/>
+            </a:pPr>
+            <a:r>
+              <a:rPr lang="en-US" sz="14500" dirty="0" smtClean="0"/>
+              <a:t>Using for research for other research</a:t>
+            </a:r>
+          </a:p>
+          <a:p>
+            <a:pPr marL="1143000" indent="-1143000">
+              <a:buFont typeface="Arial" panose="020B0604020202020204" pitchFamily="34" charset="0"/>
+              <a:buChar char="•"/>
+            </a:pPr>
+            <a:endParaRPr lang="en-US" sz="5000" dirty="0" smtClean="0"/>
+          </a:p>
+          <a:p>
+            <a:pPr marL="1143000" indent="-1143000">
+              <a:buFont typeface="Arial" panose="020B0604020202020204" pitchFamily="34" charset="0"/>
+              <a:buChar char="•"/>
+            </a:pPr>
+            <a:r>
+              <a:rPr lang="en-US" sz="14500" dirty="0" smtClean="0"/>
+              <a:t>Other connections</a:t>
+            </a:r>
+          </a:p>
+          <a:p>
+            <a:pPr marL="1143000" indent="-1143000">
+              <a:buFont typeface="Arial" panose="020B0604020202020204" pitchFamily="34" charset="0"/>
+              <a:buChar char="•"/>
+            </a:pPr>
+            <a:endParaRPr lang="en-US" sz="5000" dirty="0" smtClean="0"/>
+          </a:p>
+          <a:p>
+            <a:pPr marL="1143000" indent="-1143000">
+              <a:buFont typeface="Arial" panose="020B0604020202020204" pitchFamily="34" charset="0"/>
+              <a:buChar char="•"/>
+            </a:pPr>
+            <a:r>
+              <a:rPr lang="en-US" sz="14500" dirty="0" smtClean="0"/>
+              <a:t>Perform problems</a:t>
+            </a:r>
+          </a:p>
+          <a:p>
+            <a:endParaRPr lang="en-US" dirty="0"/>
+          </a:p>
+        </p:txBody>
+      </p:sp>
+    </p:spTree>
+    <p:extLst>
+      <p:ext uri="{BB962C8B-B14F-4D97-AF65-F5344CB8AC3E}">
+        <p14:creationId xmlns:p14="http://schemas.microsoft.com/office/powerpoint/2010/main" val="2689254134"/>
+      </p:ext>
+    </p:extLst>
+  </p:cSld>
+  <p:clrMapOvr>
+    <a:masterClrMapping/>
+  </p:clrMapOvr>
+  <p:timing>
+    <p:tnLst>
+      <p:par>
+        <p:cTn id="1" dur="indefinite" restart="never" nodeType="tmRoot"/>
+      </p:par>
+    </p:tnLst>
+  </p:timing>
+</p:sld>
+</file>
+
+<file path=ppt/slides/slide19.xml><?xml version="1.0" encoding="utf-8"?>
+<p:sld xmlns:a="http://schemas.openxmlformats.org/drawingml/2006/main" xmlns:r="http://schemas.openxmlformats.org/officeDocument/2006/relationships" xmlns:p="http://schemas.openxmlformats.org/presentationml/2006/main">
+  <p:cSld>
+    <p:bg>
+      <p:bgPr>
+        <a:solidFill>
+          <a:schemeClr val="tx2">
+            <a:lumMod val="20000"/>
+            <a:lumOff val="80000"/>
+          </a:schemeClr>
+        </a:solidFill>
+        <a:effectLst/>
+      </p:bgPr>
+    </p:bg>
+    <p:spTree>
+      <p:nvGrpSpPr>
+        <p:cNvPr id="1" name=""/>
+        <p:cNvGrpSpPr/>
+        <p:nvPr/>
+      </p:nvGrpSpPr>
+      <p:grpSpPr>
+        <a:xfrm>
+          <a:off x="0" y="0"/>
+          <a:ext cx="0" cy="0"/>
+          <a:chOff x="0" y="0"/>
+          <a:chExt cx="0" cy="0"/>
+        </a:xfrm>
+      </p:grpSpPr>
+      <p:sp>
+        <p:nvSpPr>
+          <p:cNvPr id="6" name="Rectangle 5"/>
+          <p:cNvSpPr/>
+          <p:nvPr/>
+        </p:nvSpPr>
+        <p:spPr>
+          <a:xfrm>
+            <a:off x="11430" y="0"/>
+            <a:ext cx="51194970" cy="5082988"/>
+          </a:xfrm>
+          <a:prstGeom prst="rect">
+            <a:avLst/>
+          </a:prstGeom>
+          <a:solidFill>
+            <a:schemeClr val="accent1">
+              <a:lumMod val="60000"/>
+              <a:lumOff val="40000"/>
+            </a:schemeClr>
+          </a:solidFill>
+          <a:ln>
+            <a:noFill/>
+          </a:ln>
+        </p:spPr>
+        <p:style>
+          <a:lnRef idx="2">
+            <a:schemeClr val="accent1">
+              <a:shade val="50000"/>
+            </a:schemeClr>
+          </a:lnRef>
+          <a:fillRef idx="1">
+            <a:schemeClr val="accent1"/>
+          </a:fillRef>
+          <a:effectRef idx="0">
+            <a:schemeClr val="accent1"/>
+          </a:effectRef>
+          <a:fontRef idx="minor">
+            <a:schemeClr val="lt1"/>
+          </a:fontRef>
+        </p:style>
+        <p:txBody>
+          <a:bodyPr rtlCol="0" anchor="ctr"/>
+          <a:lstStyle/>
+          <a:p>
+            <a:pPr algn="ctr"/>
+            <a:endParaRPr lang="en-US" sz="6244"/>
+          </a:p>
+        </p:txBody>
+      </p:sp>
+      <p:pic>
+        <p:nvPicPr>
+          <p:cNvPr id="4" name="Picture 3"/>
+          <p:cNvPicPr>
+            <a:picLocks noChangeAspect="1"/>
+          </p:cNvPicPr>
+          <p:nvPr/>
+        </p:nvPicPr>
+        <p:blipFill>
+          <a:blip r:embed="rId3">
+            <a:extLst>
+              <a:ext uri="{28A0092B-C50C-407E-A947-70E740481C1C}">
+                <a14:useLocalDpi xmlns:a14="http://schemas.microsoft.com/office/drawing/2010/main" val="0"/>
+              </a:ext>
+            </a:extLst>
+          </a:blip>
+          <a:stretch>
+            <a:fillRect/>
+          </a:stretch>
+        </p:blipFill>
+        <p:spPr>
+          <a:xfrm>
+            <a:off x="11430" y="0"/>
+            <a:ext cx="5435974" cy="5082988"/>
+          </a:xfrm>
+          <a:prstGeom prst="rect">
+            <a:avLst/>
+          </a:prstGeom>
+        </p:spPr>
+      </p:pic>
+      <p:sp>
+        <p:nvSpPr>
+          <p:cNvPr id="12" name="TextBox 11"/>
+          <p:cNvSpPr txBox="1"/>
+          <p:nvPr/>
+        </p:nvSpPr>
+        <p:spPr>
+          <a:xfrm>
+            <a:off x="5029200" y="384974"/>
+            <a:ext cx="46177200" cy="4313040"/>
+          </a:xfrm>
+          <a:prstGeom prst="rect">
+            <a:avLst/>
+          </a:prstGeom>
+          <a:noFill/>
+          <a:ln>
+            <a:noFill/>
+          </a:ln>
+        </p:spPr>
+        <p:txBody>
+          <a:bodyPr wrap="square" rtlCol="0">
+            <a:spAutoFit/>
+          </a:bodyPr>
+          <a:lstStyle/>
+          <a:p>
+            <a:pPr algn="ctr"/>
+            <a:endParaRPr lang="en-US" sz="927" dirty="0"/>
+          </a:p>
+          <a:p>
+            <a:pPr algn="ctr"/>
+            <a:r>
+              <a:rPr lang="en-US" sz="26500" b="1" dirty="0" smtClean="0">
+                <a:latin typeface="+mj-lt"/>
+              </a:rPr>
+              <a:t>Conclusion</a:t>
+            </a:r>
+            <a:endParaRPr lang="en-US" sz="22100" b="1" dirty="0">
+              <a:latin typeface="+mj-lt"/>
+            </a:endParaRPr>
+          </a:p>
+        </p:txBody>
+      </p:sp>
+      <p:sp>
+        <p:nvSpPr>
+          <p:cNvPr id="39" name="Rectangle 38"/>
+          <p:cNvSpPr/>
+          <p:nvPr/>
+        </p:nvSpPr>
+        <p:spPr>
+          <a:xfrm>
+            <a:off x="11430" y="27812999"/>
+            <a:ext cx="51194970" cy="797121"/>
+          </a:xfrm>
+          <a:prstGeom prst="rect">
+            <a:avLst/>
+          </a:prstGeom>
+          <a:solidFill>
+            <a:srgbClr val="00518E"/>
+          </a:solidFill>
+        </p:spPr>
+        <p:style>
+          <a:lnRef idx="2">
+            <a:schemeClr val="accent1">
+              <a:shade val="50000"/>
+            </a:schemeClr>
+          </a:lnRef>
+          <a:fillRef idx="1">
+            <a:schemeClr val="accent1"/>
+          </a:fillRef>
+          <a:effectRef idx="0">
+            <a:schemeClr val="accent1"/>
+          </a:effectRef>
+          <a:fontRef idx="minor">
+            <a:schemeClr val="lt1"/>
+          </a:fontRef>
+        </p:style>
+        <p:txBody>
+          <a:bodyPr rtlCol="0" anchor="ctr"/>
+          <a:lstStyle/>
+          <a:p>
+            <a:pPr algn="ctr"/>
+            <a:endParaRPr lang="en-US" sz="6244" dirty="0"/>
+          </a:p>
+        </p:txBody>
+      </p:sp>
+      <p:sp>
+        <p:nvSpPr>
+          <p:cNvPr id="7" name="TextBox 6"/>
+          <p:cNvSpPr txBox="1"/>
+          <p:nvPr/>
+        </p:nvSpPr>
+        <p:spPr>
+          <a:xfrm>
+            <a:off x="1600200" y="6393061"/>
+            <a:ext cx="49149000" cy="15711994"/>
+          </a:xfrm>
+          <a:prstGeom prst="rect">
+            <a:avLst/>
+          </a:prstGeom>
+          <a:noFill/>
+        </p:spPr>
+        <p:txBody>
+          <a:bodyPr wrap="square" rtlCol="0">
+            <a:spAutoFit/>
+          </a:bodyPr>
+          <a:lstStyle/>
+          <a:p>
+            <a:pPr marL="1143000" indent="-1143000">
+              <a:buFont typeface="Arial" panose="020B0604020202020204" pitchFamily="34" charset="0"/>
+              <a:buChar char="•"/>
+            </a:pPr>
+            <a:r>
+              <a:rPr lang="en-US" sz="14500" dirty="0" smtClean="0"/>
+              <a:t>Created cluster of single board computers</a:t>
+            </a:r>
+          </a:p>
+          <a:p>
+            <a:pPr marL="1143000" indent="-1143000">
+              <a:buFont typeface="Arial" panose="020B0604020202020204" pitchFamily="34" charset="0"/>
+              <a:buChar char="•"/>
+            </a:pPr>
+            <a:endParaRPr lang="en-US" sz="14500" dirty="0"/>
+          </a:p>
+          <a:p>
+            <a:pPr marL="1143000" indent="-1143000">
+              <a:buFont typeface="Arial" panose="020B0604020202020204" pitchFamily="34" charset="0"/>
+              <a:buChar char="•"/>
+            </a:pPr>
+            <a:r>
+              <a:rPr lang="en-US" sz="14500" dirty="0" smtClean="0"/>
+              <a:t>Tested several communication protocols and topologie</a:t>
+            </a:r>
+            <a:r>
+              <a:rPr lang="en-US" sz="14500" dirty="0"/>
+              <a:t>s</a:t>
+            </a:r>
+            <a:endParaRPr lang="en-US" sz="14500" dirty="0" smtClean="0"/>
+          </a:p>
+          <a:p>
+            <a:pPr marL="1143000" indent="-1143000">
+              <a:buFont typeface="Arial" panose="020B0604020202020204" pitchFamily="34" charset="0"/>
+              <a:buChar char="•"/>
+            </a:pPr>
+            <a:endParaRPr lang="en-US" sz="14500" dirty="0"/>
+          </a:p>
+          <a:p>
+            <a:pPr marL="1143000" indent="-1143000">
+              <a:buFont typeface="Arial" panose="020B0604020202020204" pitchFamily="34" charset="0"/>
+              <a:buChar char="•"/>
+            </a:pPr>
+            <a:r>
+              <a:rPr lang="en-US" sz="14500" dirty="0" smtClean="0"/>
+              <a:t>Benchmarked the cluster</a:t>
+            </a:r>
+          </a:p>
+          <a:p>
+            <a:pPr marL="1143000" indent="-1143000">
+              <a:buFont typeface="Arial" panose="020B0604020202020204" pitchFamily="34" charset="0"/>
+              <a:buChar char="•"/>
+            </a:pPr>
+            <a:endParaRPr lang="en-US" sz="14500" dirty="0"/>
+          </a:p>
+          <a:p>
+            <a:pPr marL="1143000" indent="-1143000">
+              <a:buFont typeface="Arial" panose="020B0604020202020204" pitchFamily="34" charset="0"/>
+              <a:buChar char="•"/>
+            </a:pPr>
+            <a:r>
+              <a:rPr lang="en-US" sz="14500" dirty="0" smtClean="0"/>
+              <a:t>Hand off for further study</a:t>
+            </a:r>
+            <a:endParaRPr lang="en-US" sz="14500" dirty="0" smtClean="0"/>
           </a:p>
         </p:txBody>
       </p:sp>
@@ -8527,8 +9733,13 @@
             <a:pPr lvl="1" algn="l"/>
             <a:r>
               <a:rPr lang="en-US" sz="9600" dirty="0" smtClean="0"/>
-              <a:t>4 a7 cores</a:t>
-            </a:r>
+              <a:t>4 </a:t>
+            </a:r>
+            <a:r>
+              <a:rPr lang="en-US" sz="9600" dirty="0" smtClean="0"/>
+              <a:t>A7 cores</a:t>
+            </a:r>
+            <a:endParaRPr lang="en-US" sz="9600" dirty="0" smtClean="0"/>
           </a:p>
           <a:p>
             <a:pPr lvl="1" algn="l"/>
@@ -8541,7 +9752,7 @@
             <a:pPr lvl="1" algn="l"/>
             <a:r>
               <a:rPr lang="en-US" sz="9600" dirty="0" smtClean="0"/>
-              <a:t>1 GM memory</a:t>
+              <a:t>1 GB memory</a:t>
             </a:r>
           </a:p>
           <a:p>
@@ -8763,7 +9974,23 @@
             </a:pPr>
             <a:r>
               <a:rPr lang="en-US" sz="9600" dirty="0" smtClean="0"/>
-              <a:t>	4 a7 cores, 4 a15 cores</a:t>
+              <a:t>	4 </a:t>
+            </a:r>
+            <a:r>
+              <a:rPr lang="en-US" sz="9600" dirty="0" smtClean="0"/>
+              <a:t>A7 </a:t>
+            </a:r>
+            <a:r>
+              <a:rPr lang="en-US" sz="9600" dirty="0" smtClean="0"/>
+              <a:t>cores, 4 </a:t>
+            </a:r>
+            <a:r>
+              <a:rPr lang="en-US" sz="9600" dirty="0" smtClean="0"/>
+              <a:t>A15 </a:t>
+            </a:r>
+            <a:r>
+              <a:rPr lang="en-US" sz="9600" dirty="0" smtClean="0"/>
+              <a:t>cores</a:t>
             </a:r>
           </a:p>
           <a:p>
@@ -8781,7 +10008,7 @@
             </a:pPr>
             <a:r>
               <a:rPr lang="en-US" sz="9600" dirty="0" smtClean="0"/>
-              <a:t>	2 GM memory</a:t>
+              <a:t>	2 GB memory</a:t>
             </a:r>
           </a:p>
           <a:p>
@@ -9444,8 +10671,12 @@
               <a:t>ODROID </a:t>
             </a:r>
             <a:r>
+              <a:rPr lang="en-US" sz="14500" dirty="0" smtClean="0"/>
+              <a:t>XU4</a:t>
+            </a:r>
+            <a:r>
               <a:rPr lang="en-US" sz="14500" dirty="0"/>
-              <a:t>XU 4:</a:t>
+              <a:t>:</a:t>
             </a:r>
           </a:p>
           <a:p>
@@ -10109,50 +11340,36 @@
           </a:p>
         </p:txBody>
       </p:sp>
-      <p:sp>
-        <p:nvSpPr>
-          <p:cNvPr id="2" name="TextBox 1"/>
-          <p:cNvSpPr txBox="1"/>
+      <p:pic>
+        <p:nvPicPr>
+          <p:cNvPr id="3" name="Picture 2"/>
+          <p:cNvPicPr>
+            <a:picLocks noChangeAspect="1"/>
+          </p:cNvPicPr>
           <p:nvPr/>
-        </p:nvSpPr>
-        <p:spPr>
-          <a:xfrm>
-            <a:off x="990600" y="5791200"/>
-            <a:ext cx="49149000" cy="4240648"/>
+        </p:nvPicPr>
+        <p:blipFill>
+          <a:blip r:embed="rId4">
+            <a:extLst>
+              <a:ext uri="{28A0092B-C50C-407E-A947-70E740481C1C}">
+                <a14:useLocalDpi xmlns:a14="http://schemas.microsoft.com/office/drawing/2010/main" val="0"/>
+              </a:ext>
+            </a:extLst>
+          </a:blip>
+          <a:stretch>
+            <a:fillRect/>
+          </a:stretch>
+        </p:blipFill>
+        <p:spPr>
+          <a:xfrm>
+            <a:off x="14630568" y="5980277"/>
+            <a:ext cx="21956694" cy="20986233"/>
           </a:xfrm>
           <a:prstGeom prst="rect">
             <a:avLst/>
           </a:prstGeom>
-          <a:noFill/>
-        </p:spPr>
-        <p:txBody>
-          <a:bodyPr wrap="square" rtlCol="0">
-            <a:spAutoFit/>
-          </a:bodyPr>
-          <a:lstStyle/>
-          <a:p>
-            <a:r>
-              <a:rPr lang="en-US" dirty="0"/>
-              <a:t>How to start it up</a:t>
-            </a:r>
-          </a:p>
-          <a:p>
-            <a:r>
-              <a:rPr lang="en-US" dirty="0"/>
-              <a:t>Star topology</a:t>
-            </a:r>
-          </a:p>
-          <a:p>
-            <a:r>
-              <a:rPr lang="en-US" dirty="0"/>
-              <a:t>Snow White and Seven Dwarfs</a:t>
-            </a:r>
-          </a:p>
-          <a:p>
-            <a:endParaRPr lang="en-US" dirty="0"/>
-          </a:p>
-        </p:txBody>
-      </p:sp>
+        </p:spPr>
+      </p:pic>
     </p:spTree>
     <p:extLst>
       <p:ext uri="{BB962C8B-B14F-4D97-AF65-F5344CB8AC3E}">

</xml_diff>